<commit_message>
Adding Week 3 material soon...
</commit_message>
<xml_diff>
--- a/lessons/lesson_note3.pptx
+++ b/lessons/lesson_note3.pptx
@@ -11,31 +11,12 @@
     <p:sldId id="296" r:id="rId5"/>
     <p:sldId id="293" r:id="rId6"/>
     <p:sldId id="294" r:id="rId7"/>
-    <p:sldId id="282" r:id="rId8"/>
-    <p:sldId id="295" r:id="rId9"/>
-    <p:sldId id="297" r:id="rId10"/>
-    <p:sldId id="298" r:id="rId11"/>
-    <p:sldId id="306" r:id="rId12"/>
-    <p:sldId id="307" r:id="rId13"/>
-    <p:sldId id="308" r:id="rId14"/>
-    <p:sldId id="309" r:id="rId15"/>
-    <p:sldId id="310" r:id="rId16"/>
-    <p:sldId id="311" r:id="rId17"/>
-    <p:sldId id="299" r:id="rId18"/>
-    <p:sldId id="300" r:id="rId19"/>
-    <p:sldId id="301" r:id="rId20"/>
-    <p:sldId id="303" r:id="rId21"/>
-    <p:sldId id="304" r:id="rId22"/>
-    <p:sldId id="305" r:id="rId23"/>
-    <p:sldId id="315" r:id="rId24"/>
-    <p:sldId id="312" r:id="rId25"/>
-    <p:sldId id="314" r:id="rId26"/>
-    <p:sldId id="316" r:id="rId27"/>
-    <p:sldId id="318" r:id="rId28"/>
-    <p:sldId id="317" r:id="rId29"/>
-    <p:sldId id="320" r:id="rId30"/>
-    <p:sldId id="313" r:id="rId31"/>
-    <p:sldId id="292" r:id="rId32"/>
+    <p:sldId id="321" r:id="rId8"/>
+    <p:sldId id="322" r:id="rId9"/>
+    <p:sldId id="323" r:id="rId10"/>
+    <p:sldId id="324" r:id="rId11"/>
+    <p:sldId id="313" r:id="rId12"/>
+    <p:sldId id="325" r:id="rId13"/>
   </p:sldIdLst>
   <p:sldSz cx="12192000" cy="6858000"/>
   <p:notesSz cx="6858000" cy="9144000"/>
@@ -142,6 +123,10 @@
 </p:presentation>
 </file>
 
+<file path=ppt/revisionInfo.xml><?xml version="1.0" encoding="utf-8"?>
+<p1510:revInfo xmlns:a="http://schemas.openxmlformats.org/drawingml/2006/main" xmlns:r="http://schemas.openxmlformats.org/officeDocument/2006/relationships" xmlns:p1510="http://schemas.microsoft.com/office/powerpoint/2015/10/main"/>
+</file>
+
 <file path=ppt/slideLayouts/slideLayout1.xml><?xml version="1.0" encoding="utf-8"?>
 <p:sldLayout xmlns:a="http://schemas.openxmlformats.org/drawingml/2006/main" xmlns:r="http://schemas.openxmlformats.org/officeDocument/2006/relationships" xmlns:p="http://schemas.openxmlformats.org/presentationml/2006/main" showMasterSp="0" type="title" preserve="1">
   <p:cSld name="Title Slide">
@@ -318,7 +303,7 @@
           <a:p>
             <a:fld id="{96DFF08F-DC6B-4601-B491-B0F83F6DD2DA}" type="datetimeFigureOut">
               <a:rPr lang="en-US" dirty="0"/>
-              <a:t>1/24/2018</a:t>
+              <a:t>2/3/2018</a:t>
             </a:fld>
             <a:endParaRPr lang="en-US" dirty="0"/>
           </a:p>
@@ -483,7 +468,7 @@
           <a:p>
             <a:fld id="{96DFF08F-DC6B-4601-B491-B0F83F6DD2DA}" type="datetimeFigureOut">
               <a:rPr lang="en-US" dirty="0"/>
-              <a:t>1/24/2018</a:t>
+              <a:t>2/3/2018</a:t>
             </a:fld>
             <a:endParaRPr lang="en-US" dirty="0"/>
           </a:p>
@@ -701,7 +686,7 @@
           <a:p>
             <a:fld id="{96DFF08F-DC6B-4601-B491-B0F83F6DD2DA}" type="datetimeFigureOut">
               <a:rPr lang="en-US" dirty="0"/>
-              <a:t>1/24/2018</a:t>
+              <a:t>2/3/2018</a:t>
             </a:fld>
             <a:endParaRPr lang="en-US" dirty="0"/>
           </a:p>
@@ -876,7 +861,7 @@
           <a:p>
             <a:fld id="{96DFF08F-DC6B-4601-B491-B0F83F6DD2DA}" type="datetimeFigureOut">
               <a:rPr lang="en-US" dirty="0"/>
-              <a:t>1/24/2018</a:t>
+              <a:t>2/3/2018</a:t>
             </a:fld>
             <a:endParaRPr lang="en-US" dirty="0"/>
           </a:p>
@@ -1178,7 +1163,7 @@
             <a:fld id="{96DFF08F-DC6B-4601-B491-B0F83F6DD2DA}" type="datetimeFigureOut">
               <a:rPr lang="en-US" dirty="0"/>
               <a:pPr/>
-              <a:t>1/24/2018</a:t>
+              <a:t>2/3/2018</a:t>
             </a:fld>
             <a:endParaRPr lang="en-US" dirty="0"/>
           </a:p>
@@ -1478,7 +1463,7 @@
           <a:p>
             <a:fld id="{96DFF08F-DC6B-4601-B491-B0F83F6DD2DA}" type="datetimeFigureOut">
               <a:rPr lang="en-US" dirty="0"/>
-              <a:t>1/24/2018</a:t>
+              <a:t>2/3/2018</a:t>
             </a:fld>
             <a:endParaRPr lang="en-US" dirty="0"/>
           </a:p>
@@ -1895,7 +1880,7 @@
           <a:p>
             <a:fld id="{96DFF08F-DC6B-4601-B491-B0F83F6DD2DA}" type="datetimeFigureOut">
               <a:rPr lang="en-US" dirty="0"/>
-              <a:t>1/24/2018</a:t>
+              <a:t>2/3/2018</a:t>
             </a:fld>
             <a:endParaRPr lang="en-US" dirty="0"/>
           </a:p>
@@ -2008,7 +1993,7 @@
           <a:p>
             <a:fld id="{96DFF08F-DC6B-4601-B491-B0F83F6DD2DA}" type="datetimeFigureOut">
               <a:rPr lang="en-US" dirty="0"/>
-              <a:t>1/24/2018</a:t>
+              <a:t>2/3/2018</a:t>
             </a:fld>
             <a:endParaRPr lang="en-US" dirty="0"/>
           </a:p>
@@ -2098,7 +2083,7 @@
           <a:p>
             <a:fld id="{96DFF08F-DC6B-4601-B491-B0F83F6DD2DA}" type="datetimeFigureOut">
               <a:rPr lang="en-US" dirty="0"/>
-              <a:t>1/24/2018</a:t>
+              <a:t>2/3/2018</a:t>
             </a:fld>
             <a:endParaRPr lang="en-US" dirty="0"/>
           </a:p>
@@ -2366,7 +2351,7 @@
           <a:p>
             <a:fld id="{96DFF08F-DC6B-4601-B491-B0F83F6DD2DA}" type="datetimeFigureOut">
               <a:rPr lang="en-US" dirty="0"/>
-              <a:t>1/24/2018</a:t>
+              <a:t>2/3/2018</a:t>
             </a:fld>
             <a:endParaRPr lang="en-US" dirty="0"/>
           </a:p>
@@ -2626,7 +2611,7 @@
           <a:p>
             <a:fld id="{96DFF08F-DC6B-4601-B491-B0F83F6DD2DA}" type="datetimeFigureOut">
               <a:rPr lang="en-US" dirty="0"/>
-              <a:t>1/24/2018</a:t>
+              <a:t>2/3/2018</a:t>
             </a:fld>
             <a:endParaRPr lang="en-US" dirty="0"/>
           </a:p>
@@ -2871,7 +2856,7 @@
             <a:fld id="{96DFF08F-DC6B-4601-B491-B0F83F6DD2DA}" type="datetimeFigureOut">
               <a:rPr lang="en-US" dirty="0"/>
               <a:pPr/>
-              <a:t>1/24/2018</a:t>
+              <a:t>2/3/2018</a:t>
             </a:fld>
             <a:endParaRPr lang="en-US" dirty="0"/>
           </a:p>
@@ -3444,8 +3429,12 @@
           <a:lstStyle/>
           <a:p>
             <a:r>
+              <a:rPr lang="en-CA" dirty="0" err="1"/>
+              <a:t>Javascript</a:t>
+            </a:r>
+            <a:r>
               <a:rPr lang="en-CA" dirty="0"/>
-              <a:t>Styling your HTML Page (3)</a:t>
+              <a:t> Essentials (1)</a:t>
             </a:r>
           </a:p>
         </p:txBody>
@@ -3473,13 +3462,19 @@
           <a:p>
             <a:r>
               <a:rPr lang="en-CA" dirty="0"/>
-              <a:t>You can style almost anything on HTML! </a:t>
+              <a:t>In other words, JavaScript does not contain the Java language in any way possible…</a:t>
             </a:r>
           </a:p>
           <a:p>
             <a:r>
               <a:rPr lang="en-CA" dirty="0"/>
-              <a:t>What I meant by “anything” really depends on what you want to style on your HTML page</a:t>
+              <a:t>Your variables are not quite typed</a:t>
+            </a:r>
+          </a:p>
+          <a:p>
+            <a:r>
+              <a:rPr lang="en-CA" dirty="0"/>
+              <a:t>You can write functions in two different ways that is not like in Java</a:t>
             </a:r>
           </a:p>
           <a:p>
@@ -3490,7 +3485,7 @@
     </p:spTree>
     <p:extLst>
       <p:ext uri="{BB962C8B-B14F-4D97-AF65-F5344CB8AC3E}">
-        <p14:creationId xmlns:p14="http://schemas.microsoft.com/office/powerpoint/2010/main" val="2163415682"/>
+        <p14:creationId xmlns:p14="http://schemas.microsoft.com/office/powerpoint/2010/main" val="4291014310"/>
       </p:ext>
     </p:extLst>
   </p:cSld>
@@ -3540,17 +3535,17 @@
           <a:p>
             <a:r>
               <a:rPr lang="en-CA" dirty="0"/>
-              <a:t>Styling your HTML Page (4)</a:t>
-            </a:r>
-          </a:p>
-        </p:txBody>
-      </p:sp>
-      <p:sp>
-        <p:nvSpPr>
-          <p:cNvPr id="3" name="Content Placeholder 2">
+              <a:t>Break #1</a:t>
+            </a:r>
+          </a:p>
+        </p:txBody>
+      </p:sp>
+      <p:sp>
+        <p:nvSpPr>
+          <p:cNvPr id="4" name="Content Placeholder 3">
             <a:extLst>
               <a:ext uri="{FF2B5EF4-FFF2-40B4-BE49-F238E27FC236}">
-                <a16:creationId xmlns:a16="http://schemas.microsoft.com/office/drawing/2014/main" id="{0874D5B9-99A5-404C-B507-E2DB9E45D7D9}"/>
+                <a16:creationId xmlns:a16="http://schemas.microsoft.com/office/drawing/2014/main" id="{A14C1509-144C-4E9E-BC44-38AABB128F97}"/>
               </a:ext>
             </a:extLst>
           </p:cNvPr>
@@ -3566,1367 +3561,16 @@
           <a:bodyPr/>
           <a:lstStyle/>
           <a:p>
-            <a:r>
-              <a:rPr lang="en-CA" dirty="0"/>
-              <a:t>For starters, you can stylize specific elements inside your HTML tags</a:t>
-            </a:r>
-          </a:p>
-          <a:p>
-            <a:r>
-              <a:rPr lang="en-CA" dirty="0"/>
-              <a:t>An example of this may look like the following:</a:t>
-            </a:r>
-          </a:p>
-          <a:p>
-            <a:pPr marL="0" indent="0">
-              <a:buNone/>
-            </a:pPr>
-            <a:r>
-              <a:rPr lang="en-CA" i="1" dirty="0"/>
-              <a:t>&lt;style&gt;</a:t>
-            </a:r>
-          </a:p>
-          <a:p>
-            <a:pPr marL="0" indent="0">
-              <a:buNone/>
-            </a:pPr>
-            <a:r>
-              <a:rPr lang="en-CA" i="1" dirty="0"/>
-              <a:t>        h1 {</a:t>
-            </a:r>
-          </a:p>
-          <a:p>
-            <a:pPr marL="0" indent="0">
-              <a:buNone/>
-            </a:pPr>
-            <a:r>
-              <a:rPr lang="en-CA" i="1" dirty="0"/>
-              <a:t>                font-size: 30px;</a:t>
-            </a:r>
-          </a:p>
-          <a:p>
-            <a:pPr marL="0" indent="0">
-              <a:buNone/>
-            </a:pPr>
-            <a:r>
-              <a:rPr lang="en-CA" i="1" dirty="0"/>
-              <a:t>               </a:t>
-            </a:r>
-            <a:r>
-              <a:rPr lang="en-CA" i="1" dirty="0" err="1"/>
-              <a:t>color:blue</a:t>
-            </a:r>
-            <a:r>
-              <a:rPr lang="en-CA" i="1" dirty="0"/>
-              <a:t>; </a:t>
-            </a:r>
-          </a:p>
-          <a:p>
-            <a:pPr marL="0" indent="0">
-              <a:buNone/>
-            </a:pPr>
-            <a:r>
-              <a:rPr lang="en-CA" i="1" dirty="0"/>
-              <a:t>        }</a:t>
-            </a:r>
-          </a:p>
-          <a:p>
-            <a:pPr marL="0" indent="0">
-              <a:buNone/>
-            </a:pPr>
-            <a:r>
-              <a:rPr lang="en-CA" i="1" dirty="0"/>
-              <a:t>&lt;/style&gt;</a:t>
-            </a:r>
-          </a:p>
-        </p:txBody>
-      </p:sp>
-    </p:spTree>
-    <p:extLst>
-      <p:ext uri="{BB962C8B-B14F-4D97-AF65-F5344CB8AC3E}">
-        <p14:creationId xmlns:p14="http://schemas.microsoft.com/office/powerpoint/2010/main" val="3467199126"/>
-      </p:ext>
-    </p:extLst>
-  </p:cSld>
-  <p:clrMapOvr>
-    <a:masterClrMapping/>
-  </p:clrMapOvr>
-</p:sld>
-</file>
-
-<file path=ppt/slides/slide12.xml><?xml version="1.0" encoding="utf-8"?>
-<p:sld xmlns:a="http://schemas.openxmlformats.org/drawingml/2006/main" xmlns:r="http://schemas.openxmlformats.org/officeDocument/2006/relationships" xmlns:p="http://schemas.openxmlformats.org/presentationml/2006/main">
-  <p:cSld>
-    <p:spTree>
-      <p:nvGrpSpPr>
-        <p:cNvPr id="1" name=""/>
-        <p:cNvGrpSpPr/>
-        <p:nvPr/>
-      </p:nvGrpSpPr>
-      <p:grpSpPr>
-        <a:xfrm>
-          <a:off x="0" y="0"/>
-          <a:ext cx="0" cy="0"/>
-          <a:chOff x="0" y="0"/>
-          <a:chExt cx="0" cy="0"/>
-        </a:xfrm>
-      </p:grpSpPr>
-      <p:sp>
-        <p:nvSpPr>
-          <p:cNvPr id="2" name="Title 1">
+            <a:endParaRPr lang="en-CA" dirty="0"/>
+          </a:p>
+        </p:txBody>
+      </p:sp>
+      <p:pic>
+        <p:nvPicPr>
+          <p:cNvPr id="3074" name="Picture 2" descr="Image result for Take a break memes">
             <a:extLst>
               <a:ext uri="{FF2B5EF4-FFF2-40B4-BE49-F238E27FC236}">
-                <a16:creationId xmlns:a16="http://schemas.microsoft.com/office/drawing/2014/main" id="{FD4CC6C4-B889-42E4-BA31-28441A814021}"/>
-              </a:ext>
-            </a:extLst>
-          </p:cNvPr>
-          <p:cNvSpPr>
-            <a:spLocks noGrp="1"/>
-          </p:cNvSpPr>
-          <p:nvPr>
-            <p:ph type="title"/>
-          </p:nvPr>
-        </p:nvSpPr>
-        <p:spPr/>
-        <p:txBody>
-          <a:bodyPr/>
-          <a:lstStyle/>
-          <a:p>
-            <a:r>
-              <a:rPr lang="en-CA" dirty="0"/>
-              <a:t>Styling your HTML Page (5)</a:t>
-            </a:r>
-          </a:p>
-        </p:txBody>
-      </p:sp>
-      <p:sp>
-        <p:nvSpPr>
-          <p:cNvPr id="3" name="Content Placeholder 2">
-            <a:extLst>
-              <a:ext uri="{FF2B5EF4-FFF2-40B4-BE49-F238E27FC236}">
-                <a16:creationId xmlns:a16="http://schemas.microsoft.com/office/drawing/2014/main" id="{0874D5B9-99A5-404C-B507-E2DB9E45D7D9}"/>
-              </a:ext>
-            </a:extLst>
-          </p:cNvPr>
-          <p:cNvSpPr>
-            <a:spLocks noGrp="1"/>
-          </p:cNvSpPr>
-          <p:nvPr>
-            <p:ph idx="1"/>
-          </p:nvPr>
-        </p:nvSpPr>
-        <p:spPr/>
-        <p:txBody>
-          <a:bodyPr/>
-          <a:lstStyle/>
-          <a:p>
-            <a:r>
-              <a:rPr lang="en-CA" dirty="0"/>
-              <a:t>Let’s break this down.</a:t>
-            </a:r>
-          </a:p>
-          <a:p>
-            <a:pPr marL="0" indent="0">
-              <a:buNone/>
-            </a:pPr>
-            <a:r>
-              <a:rPr lang="en-CA" i="1" dirty="0"/>
-              <a:t>&lt;style&gt;</a:t>
-            </a:r>
-          </a:p>
-          <a:p>
-            <a:pPr marL="0" indent="0">
-              <a:buNone/>
-            </a:pPr>
-            <a:r>
-              <a:rPr lang="en-CA" i="1" dirty="0"/>
-              <a:t>        h1 {</a:t>
-            </a:r>
-          </a:p>
-          <a:p>
-            <a:pPr marL="0" indent="0">
-              <a:buNone/>
-            </a:pPr>
-            <a:r>
-              <a:rPr lang="en-CA" i="1" dirty="0"/>
-              <a:t>                font-size: 30px;</a:t>
-            </a:r>
-          </a:p>
-          <a:p>
-            <a:pPr marL="0" indent="0">
-              <a:buNone/>
-            </a:pPr>
-            <a:r>
-              <a:rPr lang="en-CA" i="1" dirty="0"/>
-              <a:t>               </a:t>
-            </a:r>
-            <a:r>
-              <a:rPr lang="en-CA" i="1" dirty="0" err="1"/>
-              <a:t>color:blue</a:t>
-            </a:r>
-            <a:r>
-              <a:rPr lang="en-CA" i="1" dirty="0"/>
-              <a:t>; </a:t>
-            </a:r>
-          </a:p>
-          <a:p>
-            <a:pPr marL="0" indent="0">
-              <a:buNone/>
-            </a:pPr>
-            <a:r>
-              <a:rPr lang="en-CA" i="1" dirty="0"/>
-              <a:t>        }</a:t>
-            </a:r>
-          </a:p>
-          <a:p>
-            <a:pPr marL="0" indent="0">
-              <a:buNone/>
-            </a:pPr>
-            <a:r>
-              <a:rPr lang="en-CA" i="1" dirty="0"/>
-              <a:t>&lt;/style&gt;</a:t>
-            </a:r>
-          </a:p>
-        </p:txBody>
-      </p:sp>
-    </p:spTree>
-    <p:extLst>
-      <p:ext uri="{BB962C8B-B14F-4D97-AF65-F5344CB8AC3E}">
-        <p14:creationId xmlns:p14="http://schemas.microsoft.com/office/powerpoint/2010/main" val="4257011061"/>
-      </p:ext>
-    </p:extLst>
-  </p:cSld>
-  <p:clrMapOvr>
-    <a:masterClrMapping/>
-  </p:clrMapOvr>
-</p:sld>
-</file>
-
-<file path=ppt/slides/slide13.xml><?xml version="1.0" encoding="utf-8"?>
-<p:sld xmlns:a="http://schemas.openxmlformats.org/drawingml/2006/main" xmlns:r="http://schemas.openxmlformats.org/officeDocument/2006/relationships" xmlns:p="http://schemas.openxmlformats.org/presentationml/2006/main">
-  <p:cSld>
-    <p:spTree>
-      <p:nvGrpSpPr>
-        <p:cNvPr id="1" name=""/>
-        <p:cNvGrpSpPr/>
-        <p:nvPr/>
-      </p:nvGrpSpPr>
-      <p:grpSpPr>
-        <a:xfrm>
-          <a:off x="0" y="0"/>
-          <a:ext cx="0" cy="0"/>
-          <a:chOff x="0" y="0"/>
-          <a:chExt cx="0" cy="0"/>
-        </a:xfrm>
-      </p:grpSpPr>
-      <p:sp>
-        <p:nvSpPr>
-          <p:cNvPr id="2" name="Title 1">
-            <a:extLst>
-              <a:ext uri="{FF2B5EF4-FFF2-40B4-BE49-F238E27FC236}">
-                <a16:creationId xmlns:a16="http://schemas.microsoft.com/office/drawing/2014/main" id="{FD4CC6C4-B889-42E4-BA31-28441A814021}"/>
-              </a:ext>
-            </a:extLst>
-          </p:cNvPr>
-          <p:cNvSpPr>
-            <a:spLocks noGrp="1"/>
-          </p:cNvSpPr>
-          <p:nvPr>
-            <p:ph type="title"/>
-          </p:nvPr>
-        </p:nvSpPr>
-        <p:spPr/>
-        <p:txBody>
-          <a:bodyPr/>
-          <a:lstStyle/>
-          <a:p>
-            <a:r>
-              <a:rPr lang="en-CA" dirty="0"/>
-              <a:t>Styling your HTML Page (6)</a:t>
-            </a:r>
-          </a:p>
-        </p:txBody>
-      </p:sp>
-      <p:sp>
-        <p:nvSpPr>
-          <p:cNvPr id="3" name="Content Placeholder 2">
-            <a:extLst>
-              <a:ext uri="{FF2B5EF4-FFF2-40B4-BE49-F238E27FC236}">
-                <a16:creationId xmlns:a16="http://schemas.microsoft.com/office/drawing/2014/main" id="{0874D5B9-99A5-404C-B507-E2DB9E45D7D9}"/>
-              </a:ext>
-            </a:extLst>
-          </p:cNvPr>
-          <p:cNvSpPr>
-            <a:spLocks noGrp="1"/>
-          </p:cNvSpPr>
-          <p:nvPr>
-            <p:ph idx="1"/>
-          </p:nvPr>
-        </p:nvSpPr>
-        <p:spPr/>
-        <p:txBody>
-          <a:bodyPr/>
-          <a:lstStyle/>
-          <a:p>
-            <a:r>
-              <a:rPr lang="en-CA" dirty="0"/>
-              <a:t>We can see that we will apply the following styling rules to the header h1 HTML tag.</a:t>
-            </a:r>
-          </a:p>
-          <a:p>
-            <a:pPr marL="0" indent="0">
-              <a:buNone/>
-            </a:pPr>
-            <a:r>
-              <a:rPr lang="en-CA" i="1" dirty="0"/>
-              <a:t>&lt;style&gt;</a:t>
-            </a:r>
-          </a:p>
-          <a:p>
-            <a:pPr marL="0" indent="0">
-              <a:buNone/>
-            </a:pPr>
-            <a:r>
-              <a:rPr lang="en-CA" i="1" dirty="0"/>
-              <a:t>        h1 {</a:t>
-            </a:r>
-          </a:p>
-          <a:p>
-            <a:pPr marL="0" indent="0">
-              <a:buNone/>
-            </a:pPr>
-            <a:r>
-              <a:rPr lang="en-CA" i="1" dirty="0"/>
-              <a:t>                font-size: 30px;</a:t>
-            </a:r>
-          </a:p>
-          <a:p>
-            <a:pPr marL="0" indent="0">
-              <a:buNone/>
-            </a:pPr>
-            <a:r>
-              <a:rPr lang="en-CA" i="1" dirty="0"/>
-              <a:t>               </a:t>
-            </a:r>
-            <a:r>
-              <a:rPr lang="en-CA" i="1" dirty="0" err="1"/>
-              <a:t>color:blue</a:t>
-            </a:r>
-            <a:r>
-              <a:rPr lang="en-CA" i="1" dirty="0"/>
-              <a:t>; </a:t>
-            </a:r>
-          </a:p>
-          <a:p>
-            <a:pPr marL="0" indent="0">
-              <a:buNone/>
-            </a:pPr>
-            <a:r>
-              <a:rPr lang="en-CA" i="1" dirty="0"/>
-              <a:t>        }</a:t>
-            </a:r>
-          </a:p>
-          <a:p>
-            <a:pPr marL="0" indent="0">
-              <a:buNone/>
-            </a:pPr>
-            <a:r>
-              <a:rPr lang="en-CA" i="1" dirty="0"/>
-              <a:t>&lt;/style&gt;</a:t>
-            </a:r>
-          </a:p>
-        </p:txBody>
-      </p:sp>
-    </p:spTree>
-    <p:extLst>
-      <p:ext uri="{BB962C8B-B14F-4D97-AF65-F5344CB8AC3E}">
-        <p14:creationId xmlns:p14="http://schemas.microsoft.com/office/powerpoint/2010/main" val="183403005"/>
-      </p:ext>
-    </p:extLst>
-  </p:cSld>
-  <p:clrMapOvr>
-    <a:masterClrMapping/>
-  </p:clrMapOvr>
-</p:sld>
-</file>
-
-<file path=ppt/slides/slide14.xml><?xml version="1.0" encoding="utf-8"?>
-<p:sld xmlns:a="http://schemas.openxmlformats.org/drawingml/2006/main" xmlns:r="http://schemas.openxmlformats.org/officeDocument/2006/relationships" xmlns:p="http://schemas.openxmlformats.org/presentationml/2006/main">
-  <p:cSld>
-    <p:spTree>
-      <p:nvGrpSpPr>
-        <p:cNvPr id="1" name=""/>
-        <p:cNvGrpSpPr/>
-        <p:nvPr/>
-      </p:nvGrpSpPr>
-      <p:grpSpPr>
-        <a:xfrm>
-          <a:off x="0" y="0"/>
-          <a:ext cx="0" cy="0"/>
-          <a:chOff x="0" y="0"/>
-          <a:chExt cx="0" cy="0"/>
-        </a:xfrm>
-      </p:grpSpPr>
-      <p:sp>
-        <p:nvSpPr>
-          <p:cNvPr id="2" name="Title 1">
-            <a:extLst>
-              <a:ext uri="{FF2B5EF4-FFF2-40B4-BE49-F238E27FC236}">
-                <a16:creationId xmlns:a16="http://schemas.microsoft.com/office/drawing/2014/main" id="{FD4CC6C4-B889-42E4-BA31-28441A814021}"/>
-              </a:ext>
-            </a:extLst>
-          </p:cNvPr>
-          <p:cNvSpPr>
-            <a:spLocks noGrp="1"/>
-          </p:cNvSpPr>
-          <p:nvPr>
-            <p:ph type="title"/>
-          </p:nvPr>
-        </p:nvSpPr>
-        <p:spPr/>
-        <p:txBody>
-          <a:bodyPr/>
-          <a:lstStyle/>
-          <a:p>
-            <a:r>
-              <a:rPr lang="en-CA" dirty="0"/>
-              <a:t>Styling your HTML Page (7)</a:t>
-            </a:r>
-          </a:p>
-        </p:txBody>
-      </p:sp>
-      <p:sp>
-        <p:nvSpPr>
-          <p:cNvPr id="3" name="Content Placeholder 2">
-            <a:extLst>
-              <a:ext uri="{FF2B5EF4-FFF2-40B4-BE49-F238E27FC236}">
-                <a16:creationId xmlns:a16="http://schemas.microsoft.com/office/drawing/2014/main" id="{0874D5B9-99A5-404C-B507-E2DB9E45D7D9}"/>
-              </a:ext>
-            </a:extLst>
-          </p:cNvPr>
-          <p:cNvSpPr>
-            <a:spLocks noGrp="1"/>
-          </p:cNvSpPr>
-          <p:nvPr>
-            <p:ph idx="1"/>
-          </p:nvPr>
-        </p:nvSpPr>
-        <p:spPr/>
-        <p:txBody>
-          <a:bodyPr/>
-          <a:lstStyle/>
-          <a:p>
-            <a:r>
-              <a:rPr lang="en-CA" dirty="0"/>
-              <a:t>Whenever we call the &lt;h1&gt; tags, those rules will apply.</a:t>
-            </a:r>
-          </a:p>
-          <a:p>
-            <a:pPr marL="0" indent="0">
-              <a:buNone/>
-            </a:pPr>
-            <a:r>
-              <a:rPr lang="en-CA" i="1" dirty="0"/>
-              <a:t>&lt;style&gt;</a:t>
-            </a:r>
-          </a:p>
-          <a:p>
-            <a:pPr marL="0" indent="0">
-              <a:buNone/>
-            </a:pPr>
-            <a:r>
-              <a:rPr lang="en-CA" i="1" dirty="0"/>
-              <a:t>        h1 {</a:t>
-            </a:r>
-          </a:p>
-          <a:p>
-            <a:pPr marL="0" indent="0">
-              <a:buNone/>
-            </a:pPr>
-            <a:r>
-              <a:rPr lang="en-CA" i="1" dirty="0"/>
-              <a:t>                font-size: 30px;</a:t>
-            </a:r>
-          </a:p>
-          <a:p>
-            <a:pPr marL="0" indent="0">
-              <a:buNone/>
-            </a:pPr>
-            <a:r>
-              <a:rPr lang="en-CA" i="1" dirty="0"/>
-              <a:t>               </a:t>
-            </a:r>
-            <a:r>
-              <a:rPr lang="en-CA" i="1" dirty="0" err="1"/>
-              <a:t>color:blue</a:t>
-            </a:r>
-            <a:r>
-              <a:rPr lang="en-CA" i="1" dirty="0"/>
-              <a:t>; </a:t>
-            </a:r>
-          </a:p>
-          <a:p>
-            <a:pPr marL="0" indent="0">
-              <a:buNone/>
-            </a:pPr>
-            <a:r>
-              <a:rPr lang="en-CA" i="1" dirty="0"/>
-              <a:t>        }</a:t>
-            </a:r>
-          </a:p>
-          <a:p>
-            <a:pPr marL="0" indent="0">
-              <a:buNone/>
-            </a:pPr>
-            <a:r>
-              <a:rPr lang="en-CA" i="1" dirty="0"/>
-              <a:t>&lt;/style&gt;</a:t>
-            </a:r>
-          </a:p>
-        </p:txBody>
-      </p:sp>
-    </p:spTree>
-    <p:extLst>
-      <p:ext uri="{BB962C8B-B14F-4D97-AF65-F5344CB8AC3E}">
-        <p14:creationId xmlns:p14="http://schemas.microsoft.com/office/powerpoint/2010/main" val="2151926586"/>
-      </p:ext>
-    </p:extLst>
-  </p:cSld>
-  <p:clrMapOvr>
-    <a:masterClrMapping/>
-  </p:clrMapOvr>
-</p:sld>
-</file>
-
-<file path=ppt/slides/slide15.xml><?xml version="1.0" encoding="utf-8"?>
-<p:sld xmlns:a="http://schemas.openxmlformats.org/drawingml/2006/main" xmlns:r="http://schemas.openxmlformats.org/officeDocument/2006/relationships" xmlns:p="http://schemas.openxmlformats.org/presentationml/2006/main">
-  <p:cSld>
-    <p:spTree>
-      <p:nvGrpSpPr>
-        <p:cNvPr id="1" name=""/>
-        <p:cNvGrpSpPr/>
-        <p:nvPr/>
-      </p:nvGrpSpPr>
-      <p:grpSpPr>
-        <a:xfrm>
-          <a:off x="0" y="0"/>
-          <a:ext cx="0" cy="0"/>
-          <a:chOff x="0" y="0"/>
-          <a:chExt cx="0" cy="0"/>
-        </a:xfrm>
-      </p:grpSpPr>
-      <p:sp>
-        <p:nvSpPr>
-          <p:cNvPr id="2" name="Title 1">
-            <a:extLst>
-              <a:ext uri="{FF2B5EF4-FFF2-40B4-BE49-F238E27FC236}">
-                <a16:creationId xmlns:a16="http://schemas.microsoft.com/office/drawing/2014/main" id="{FD4CC6C4-B889-42E4-BA31-28441A814021}"/>
-              </a:ext>
-            </a:extLst>
-          </p:cNvPr>
-          <p:cNvSpPr>
-            <a:spLocks noGrp="1"/>
-          </p:cNvSpPr>
-          <p:nvPr>
-            <p:ph type="title"/>
-          </p:nvPr>
-        </p:nvSpPr>
-        <p:spPr/>
-        <p:txBody>
-          <a:bodyPr/>
-          <a:lstStyle/>
-          <a:p>
-            <a:r>
-              <a:rPr lang="en-CA" dirty="0"/>
-              <a:t>Styling your HTML Page (8)</a:t>
-            </a:r>
-          </a:p>
-        </p:txBody>
-      </p:sp>
-      <p:sp>
-        <p:nvSpPr>
-          <p:cNvPr id="3" name="Content Placeholder 2">
-            <a:extLst>
-              <a:ext uri="{FF2B5EF4-FFF2-40B4-BE49-F238E27FC236}">
-                <a16:creationId xmlns:a16="http://schemas.microsoft.com/office/drawing/2014/main" id="{0874D5B9-99A5-404C-B507-E2DB9E45D7D9}"/>
-              </a:ext>
-            </a:extLst>
-          </p:cNvPr>
-          <p:cNvSpPr>
-            <a:spLocks noGrp="1"/>
-          </p:cNvSpPr>
-          <p:nvPr>
-            <p:ph idx="1"/>
-          </p:nvPr>
-        </p:nvSpPr>
-        <p:spPr/>
-        <p:txBody>
-          <a:bodyPr/>
-          <a:lstStyle/>
-          <a:p>
-            <a:r>
-              <a:rPr lang="en-CA" dirty="0"/>
-              <a:t>The elements inside &lt;h1&gt; tags will have 30px font size and the text will be coloured blue.</a:t>
-            </a:r>
-          </a:p>
-          <a:p>
-            <a:pPr marL="0" indent="0">
-              <a:buNone/>
-            </a:pPr>
-            <a:r>
-              <a:rPr lang="en-CA" i="1" dirty="0"/>
-              <a:t>&lt;style&gt;</a:t>
-            </a:r>
-          </a:p>
-          <a:p>
-            <a:pPr marL="0" indent="0">
-              <a:buNone/>
-            </a:pPr>
-            <a:r>
-              <a:rPr lang="en-CA" i="1" dirty="0"/>
-              <a:t>        h1 {</a:t>
-            </a:r>
-          </a:p>
-          <a:p>
-            <a:pPr marL="0" indent="0">
-              <a:buNone/>
-            </a:pPr>
-            <a:r>
-              <a:rPr lang="en-CA" i="1" dirty="0"/>
-              <a:t>                font-size: 30px;</a:t>
-            </a:r>
-          </a:p>
-          <a:p>
-            <a:pPr marL="0" indent="0">
-              <a:buNone/>
-            </a:pPr>
-            <a:r>
-              <a:rPr lang="en-CA" i="1" dirty="0"/>
-              <a:t>               </a:t>
-            </a:r>
-            <a:r>
-              <a:rPr lang="en-CA" i="1" dirty="0" err="1"/>
-              <a:t>color:blue</a:t>
-            </a:r>
-            <a:r>
-              <a:rPr lang="en-CA" i="1" dirty="0"/>
-              <a:t>; </a:t>
-            </a:r>
-          </a:p>
-          <a:p>
-            <a:pPr marL="0" indent="0">
-              <a:buNone/>
-            </a:pPr>
-            <a:r>
-              <a:rPr lang="en-CA" i="1" dirty="0"/>
-              <a:t>        }</a:t>
-            </a:r>
-          </a:p>
-          <a:p>
-            <a:pPr marL="0" indent="0">
-              <a:buNone/>
-            </a:pPr>
-            <a:r>
-              <a:rPr lang="en-CA" i="1" dirty="0"/>
-              <a:t>&lt;/style&gt;</a:t>
-            </a:r>
-          </a:p>
-        </p:txBody>
-      </p:sp>
-    </p:spTree>
-    <p:extLst>
-      <p:ext uri="{BB962C8B-B14F-4D97-AF65-F5344CB8AC3E}">
-        <p14:creationId xmlns:p14="http://schemas.microsoft.com/office/powerpoint/2010/main" val="56260239"/>
-      </p:ext>
-    </p:extLst>
-  </p:cSld>
-  <p:clrMapOvr>
-    <a:masterClrMapping/>
-  </p:clrMapOvr>
-</p:sld>
-</file>
-
-<file path=ppt/slides/slide16.xml><?xml version="1.0" encoding="utf-8"?>
-<p:sld xmlns:a="http://schemas.openxmlformats.org/drawingml/2006/main" xmlns:r="http://schemas.openxmlformats.org/officeDocument/2006/relationships" xmlns:p="http://schemas.openxmlformats.org/presentationml/2006/main">
-  <p:cSld>
-    <p:spTree>
-      <p:nvGrpSpPr>
-        <p:cNvPr id="1" name=""/>
-        <p:cNvGrpSpPr/>
-        <p:nvPr/>
-      </p:nvGrpSpPr>
-      <p:grpSpPr>
-        <a:xfrm>
-          <a:off x="0" y="0"/>
-          <a:ext cx="0" cy="0"/>
-          <a:chOff x="0" y="0"/>
-          <a:chExt cx="0" cy="0"/>
-        </a:xfrm>
-      </p:grpSpPr>
-      <p:sp>
-        <p:nvSpPr>
-          <p:cNvPr id="2" name="Title 1">
-            <a:extLst>
-              <a:ext uri="{FF2B5EF4-FFF2-40B4-BE49-F238E27FC236}">
-                <a16:creationId xmlns:a16="http://schemas.microsoft.com/office/drawing/2014/main" id="{FD4CC6C4-B889-42E4-BA31-28441A814021}"/>
-              </a:ext>
-            </a:extLst>
-          </p:cNvPr>
-          <p:cNvSpPr>
-            <a:spLocks noGrp="1"/>
-          </p:cNvSpPr>
-          <p:nvPr>
-            <p:ph type="title"/>
-          </p:nvPr>
-        </p:nvSpPr>
-        <p:spPr/>
-        <p:txBody>
-          <a:bodyPr/>
-          <a:lstStyle/>
-          <a:p>
-            <a:r>
-              <a:rPr lang="en-CA" dirty="0"/>
-              <a:t>Styling your HTML Page (9)</a:t>
-            </a:r>
-          </a:p>
-        </p:txBody>
-      </p:sp>
-      <p:sp>
-        <p:nvSpPr>
-          <p:cNvPr id="3" name="Content Placeholder 2">
-            <a:extLst>
-              <a:ext uri="{FF2B5EF4-FFF2-40B4-BE49-F238E27FC236}">
-                <a16:creationId xmlns:a16="http://schemas.microsoft.com/office/drawing/2014/main" id="{0874D5B9-99A5-404C-B507-E2DB9E45D7D9}"/>
-              </a:ext>
-            </a:extLst>
-          </p:cNvPr>
-          <p:cNvSpPr>
-            <a:spLocks noGrp="1"/>
-          </p:cNvSpPr>
-          <p:nvPr>
-            <p:ph idx="1"/>
-          </p:nvPr>
-        </p:nvSpPr>
-        <p:spPr/>
-        <p:txBody>
-          <a:bodyPr>
-            <a:normAutofit lnSpcReduction="10000"/>
-          </a:bodyPr>
-          <a:lstStyle/>
-          <a:p>
-            <a:r>
-              <a:rPr lang="en-CA" dirty="0"/>
-              <a:t>We can style much more than that…</a:t>
-            </a:r>
-          </a:p>
-          <a:p>
-            <a:pPr marL="0" indent="0">
-              <a:buNone/>
-            </a:pPr>
-            <a:r>
-              <a:rPr lang="en-CA" i="1" dirty="0"/>
-              <a:t>&lt;style&gt;</a:t>
-            </a:r>
-          </a:p>
-          <a:p>
-            <a:pPr marL="0" indent="0">
-              <a:buNone/>
-            </a:pPr>
-            <a:r>
-              <a:rPr lang="en-CA" i="1" dirty="0"/>
-              <a:t>        h1 { … }</a:t>
-            </a:r>
-          </a:p>
-          <a:p>
-            <a:pPr marL="0" indent="0">
-              <a:buNone/>
-            </a:pPr>
-            <a:r>
-              <a:rPr lang="en-CA" i="1" dirty="0"/>
-              <a:t>        div {</a:t>
-            </a:r>
-          </a:p>
-          <a:p>
-            <a:pPr marL="0" indent="0">
-              <a:buNone/>
-            </a:pPr>
-            <a:r>
-              <a:rPr lang="en-CA" i="1" dirty="0"/>
-              <a:t>                font-style: bold;</a:t>
-            </a:r>
-          </a:p>
-          <a:p>
-            <a:pPr marL="0" indent="0">
-              <a:buNone/>
-            </a:pPr>
-            <a:r>
-              <a:rPr lang="en-CA" i="1" dirty="0"/>
-              <a:t>                color-background: coral;</a:t>
-            </a:r>
-          </a:p>
-          <a:p>
-            <a:pPr marL="0" indent="0">
-              <a:buNone/>
-            </a:pPr>
-            <a:r>
-              <a:rPr lang="en-CA" i="1" dirty="0"/>
-              <a:t>        }</a:t>
-            </a:r>
-          </a:p>
-          <a:p>
-            <a:pPr marL="0" indent="0">
-              <a:buNone/>
-            </a:pPr>
-            <a:r>
-              <a:rPr lang="en-CA" i="1" dirty="0"/>
-              <a:t>&lt;/style&gt;</a:t>
-            </a:r>
-          </a:p>
-          <a:p>
-            <a:r>
-              <a:rPr lang="en-CA" dirty="0"/>
-              <a:t>What do you guys think this will do?</a:t>
-            </a:r>
-          </a:p>
-        </p:txBody>
-      </p:sp>
-    </p:spTree>
-    <p:extLst>
-      <p:ext uri="{BB962C8B-B14F-4D97-AF65-F5344CB8AC3E}">
-        <p14:creationId xmlns:p14="http://schemas.microsoft.com/office/powerpoint/2010/main" val="1707263034"/>
-      </p:ext>
-    </p:extLst>
-  </p:cSld>
-  <p:clrMapOvr>
-    <a:masterClrMapping/>
-  </p:clrMapOvr>
-</p:sld>
-</file>
-
-<file path=ppt/slides/slide17.xml><?xml version="1.0" encoding="utf-8"?>
-<p:sld xmlns:a="http://schemas.openxmlformats.org/drawingml/2006/main" xmlns:r="http://schemas.openxmlformats.org/officeDocument/2006/relationships" xmlns:p="http://schemas.openxmlformats.org/presentationml/2006/main">
-  <p:cSld>
-    <p:spTree>
-      <p:nvGrpSpPr>
-        <p:cNvPr id="1" name=""/>
-        <p:cNvGrpSpPr/>
-        <p:nvPr/>
-      </p:nvGrpSpPr>
-      <p:grpSpPr>
-        <a:xfrm>
-          <a:off x="0" y="0"/>
-          <a:ext cx="0" cy="0"/>
-          <a:chOff x="0" y="0"/>
-          <a:chExt cx="0" cy="0"/>
-        </a:xfrm>
-      </p:grpSpPr>
-      <p:sp>
-        <p:nvSpPr>
-          <p:cNvPr id="2" name="Title 1">
-            <a:extLst>
-              <a:ext uri="{FF2B5EF4-FFF2-40B4-BE49-F238E27FC236}">
-                <a16:creationId xmlns:a16="http://schemas.microsoft.com/office/drawing/2014/main" id="{FD4CC6C4-B889-42E4-BA31-28441A814021}"/>
-              </a:ext>
-            </a:extLst>
-          </p:cNvPr>
-          <p:cNvSpPr>
-            <a:spLocks noGrp="1"/>
-          </p:cNvSpPr>
-          <p:nvPr>
-            <p:ph type="title"/>
-          </p:nvPr>
-        </p:nvSpPr>
-        <p:spPr/>
-        <p:txBody>
-          <a:bodyPr/>
-          <a:lstStyle/>
-          <a:p>
-            <a:r>
-              <a:rPr lang="en-CA" dirty="0"/>
-              <a:t>Styling your HTML Page (10)</a:t>
-            </a:r>
-          </a:p>
-        </p:txBody>
-      </p:sp>
-      <p:sp>
-        <p:nvSpPr>
-          <p:cNvPr id="3" name="Content Placeholder 2">
-            <a:extLst>
-              <a:ext uri="{FF2B5EF4-FFF2-40B4-BE49-F238E27FC236}">
-                <a16:creationId xmlns:a16="http://schemas.microsoft.com/office/drawing/2014/main" id="{0874D5B9-99A5-404C-B507-E2DB9E45D7D9}"/>
-              </a:ext>
-            </a:extLst>
-          </p:cNvPr>
-          <p:cNvSpPr>
-            <a:spLocks noGrp="1"/>
-          </p:cNvSpPr>
-          <p:nvPr>
-            <p:ph idx="1"/>
-          </p:nvPr>
-        </p:nvSpPr>
-        <p:spPr/>
-        <p:txBody>
-          <a:bodyPr/>
-          <a:lstStyle/>
-          <a:p>
-            <a:r>
-              <a:rPr lang="en-CA" dirty="0"/>
-              <a:t>Of course, before we go in-depth, we need to take a look at </a:t>
-            </a:r>
-            <a:r>
-              <a:rPr lang="en-CA" i="1" dirty="0"/>
-              <a:t>classes</a:t>
-            </a:r>
-            <a:r>
-              <a:rPr lang="en-CA" dirty="0"/>
-              <a:t> and </a:t>
-            </a:r>
-            <a:r>
-              <a:rPr lang="en-CA" i="1" dirty="0"/>
-              <a:t>ID</a:t>
-            </a:r>
-            <a:r>
-              <a:rPr lang="en-CA" dirty="0"/>
-              <a:t> attributes on an HTML page first. </a:t>
-            </a:r>
-          </a:p>
-          <a:p>
-            <a:r>
-              <a:rPr lang="en-CA" dirty="0"/>
-              <a:t>They help greatly when defining what you want in your &lt;style&gt; tags.</a:t>
-            </a:r>
-          </a:p>
-          <a:p>
-            <a:endParaRPr lang="en-CA" dirty="0"/>
-          </a:p>
-        </p:txBody>
-      </p:sp>
-    </p:spTree>
-    <p:extLst>
-      <p:ext uri="{BB962C8B-B14F-4D97-AF65-F5344CB8AC3E}">
-        <p14:creationId xmlns:p14="http://schemas.microsoft.com/office/powerpoint/2010/main" val="3716735924"/>
-      </p:ext>
-    </p:extLst>
-  </p:cSld>
-  <p:clrMapOvr>
-    <a:masterClrMapping/>
-  </p:clrMapOvr>
-</p:sld>
-</file>
-
-<file path=ppt/slides/slide18.xml><?xml version="1.0" encoding="utf-8"?>
-<p:sld xmlns:a="http://schemas.openxmlformats.org/drawingml/2006/main" xmlns:r="http://schemas.openxmlformats.org/officeDocument/2006/relationships" xmlns:p="http://schemas.openxmlformats.org/presentationml/2006/main">
-  <p:cSld>
-    <p:spTree>
-      <p:nvGrpSpPr>
-        <p:cNvPr id="1" name=""/>
-        <p:cNvGrpSpPr/>
-        <p:nvPr/>
-      </p:nvGrpSpPr>
-      <p:grpSpPr>
-        <a:xfrm>
-          <a:off x="0" y="0"/>
-          <a:ext cx="0" cy="0"/>
-          <a:chOff x="0" y="0"/>
-          <a:chExt cx="0" cy="0"/>
-        </a:xfrm>
-      </p:grpSpPr>
-      <p:sp>
-        <p:nvSpPr>
-          <p:cNvPr id="2" name="Title 1">
-            <a:extLst>
-              <a:ext uri="{FF2B5EF4-FFF2-40B4-BE49-F238E27FC236}">
-                <a16:creationId xmlns:a16="http://schemas.microsoft.com/office/drawing/2014/main" id="{FD4CC6C4-B889-42E4-BA31-28441A814021}"/>
-              </a:ext>
-            </a:extLst>
-          </p:cNvPr>
-          <p:cNvSpPr>
-            <a:spLocks noGrp="1"/>
-          </p:cNvSpPr>
-          <p:nvPr>
-            <p:ph type="title"/>
-          </p:nvPr>
-        </p:nvSpPr>
-        <p:spPr/>
-        <p:txBody>
-          <a:bodyPr/>
-          <a:lstStyle/>
-          <a:p>
-            <a:r>
-              <a:rPr lang="en-CA" dirty="0"/>
-              <a:t>Going back to HTML basics… Attributes (1)</a:t>
-            </a:r>
-          </a:p>
-        </p:txBody>
-      </p:sp>
-      <p:sp>
-        <p:nvSpPr>
-          <p:cNvPr id="3" name="Content Placeholder 2">
-            <a:extLst>
-              <a:ext uri="{FF2B5EF4-FFF2-40B4-BE49-F238E27FC236}">
-                <a16:creationId xmlns:a16="http://schemas.microsoft.com/office/drawing/2014/main" id="{0874D5B9-99A5-404C-B507-E2DB9E45D7D9}"/>
-              </a:ext>
-            </a:extLst>
-          </p:cNvPr>
-          <p:cNvSpPr>
-            <a:spLocks noGrp="1"/>
-          </p:cNvSpPr>
-          <p:nvPr>
-            <p:ph idx="1"/>
-          </p:nvPr>
-        </p:nvSpPr>
-        <p:spPr/>
-        <p:txBody>
-          <a:bodyPr/>
-          <a:lstStyle/>
-          <a:p>
-            <a:r>
-              <a:rPr lang="en-CA" dirty="0"/>
-              <a:t>What is a class attribute?</a:t>
-            </a:r>
-          </a:p>
-          <a:p>
-            <a:pPr lvl="1"/>
-            <a:r>
-              <a:rPr lang="en-CA" dirty="0"/>
-              <a:t>These class attributes are defined in your HTML tags</a:t>
-            </a:r>
-          </a:p>
-          <a:p>
-            <a:pPr lvl="1"/>
-            <a:r>
-              <a:rPr lang="en-CA" dirty="0"/>
-              <a:t>They often associate themselves with the element inside your HTML tags</a:t>
-            </a:r>
-          </a:p>
-          <a:p>
-            <a:pPr lvl="1"/>
-            <a:r>
-              <a:rPr lang="en-CA" dirty="0"/>
-              <a:t>You can use the same class attribute value as many times as you want</a:t>
-            </a:r>
-          </a:p>
-          <a:p>
-            <a:pPr lvl="1"/>
-            <a:r>
-              <a:rPr lang="en-CA" dirty="0"/>
-              <a:t>They are helpful especially when you want to stylize a particular piece of information as opposed to all of the information on the HTML page</a:t>
-            </a:r>
-          </a:p>
-          <a:p>
-            <a:pPr lvl="1"/>
-            <a:r>
-              <a:rPr lang="en-CA" dirty="0"/>
-              <a:t>They can also be referred to for functionality using JavaScript (but we will see that during lesson 4)</a:t>
-            </a:r>
-          </a:p>
-          <a:p>
-            <a:r>
-              <a:rPr lang="en-CA" dirty="0"/>
-              <a:t>What does a class look like?</a:t>
-            </a:r>
-          </a:p>
-          <a:p>
-            <a:pPr lvl="1"/>
-            <a:r>
-              <a:rPr lang="en-CA" dirty="0"/>
-              <a:t>An example:</a:t>
-            </a:r>
-          </a:p>
-          <a:p>
-            <a:pPr marL="0" indent="0" algn="ctr">
-              <a:buNone/>
-            </a:pPr>
-            <a:r>
-              <a:rPr lang="en-CA" i="1" dirty="0"/>
-              <a:t>&lt;div class=“</a:t>
-            </a:r>
-            <a:r>
-              <a:rPr lang="en-CA" i="1" dirty="0" err="1"/>
-              <a:t>anExample</a:t>
-            </a:r>
-            <a:r>
-              <a:rPr lang="en-CA" i="1" dirty="0"/>
-              <a:t>”&gt; … &lt;/div&gt;</a:t>
-            </a:r>
-          </a:p>
-          <a:p>
-            <a:endParaRPr lang="en-CA" dirty="0"/>
-          </a:p>
-        </p:txBody>
-      </p:sp>
-    </p:spTree>
-    <p:extLst>
-      <p:ext uri="{BB962C8B-B14F-4D97-AF65-F5344CB8AC3E}">
-        <p14:creationId xmlns:p14="http://schemas.microsoft.com/office/powerpoint/2010/main" val="228947623"/>
-      </p:ext>
-    </p:extLst>
-  </p:cSld>
-  <p:clrMapOvr>
-    <a:masterClrMapping/>
-  </p:clrMapOvr>
-</p:sld>
-</file>
-
-<file path=ppt/slides/slide19.xml><?xml version="1.0" encoding="utf-8"?>
-<p:sld xmlns:a="http://schemas.openxmlformats.org/drawingml/2006/main" xmlns:r="http://schemas.openxmlformats.org/officeDocument/2006/relationships" xmlns:p="http://schemas.openxmlformats.org/presentationml/2006/main">
-  <p:cSld>
-    <p:spTree>
-      <p:nvGrpSpPr>
-        <p:cNvPr id="1" name=""/>
-        <p:cNvGrpSpPr/>
-        <p:nvPr/>
-      </p:nvGrpSpPr>
-      <p:grpSpPr>
-        <a:xfrm>
-          <a:off x="0" y="0"/>
-          <a:ext cx="0" cy="0"/>
-          <a:chOff x="0" y="0"/>
-          <a:chExt cx="0" cy="0"/>
-        </a:xfrm>
-      </p:grpSpPr>
-      <p:sp>
-        <p:nvSpPr>
-          <p:cNvPr id="2" name="Title 1">
-            <a:extLst>
-              <a:ext uri="{FF2B5EF4-FFF2-40B4-BE49-F238E27FC236}">
-                <a16:creationId xmlns:a16="http://schemas.microsoft.com/office/drawing/2014/main" id="{FD4CC6C4-B889-42E4-BA31-28441A814021}"/>
-              </a:ext>
-            </a:extLst>
-          </p:cNvPr>
-          <p:cNvSpPr>
-            <a:spLocks noGrp="1"/>
-          </p:cNvSpPr>
-          <p:nvPr>
-            <p:ph type="title"/>
-          </p:nvPr>
-        </p:nvSpPr>
-        <p:spPr/>
-        <p:txBody>
-          <a:bodyPr/>
-          <a:lstStyle/>
-          <a:p>
-            <a:r>
-              <a:rPr lang="en-CA" dirty="0"/>
-              <a:t>Going back to HTML basics… Attributes (2)</a:t>
-            </a:r>
-          </a:p>
-        </p:txBody>
-      </p:sp>
-      <p:sp>
-        <p:nvSpPr>
-          <p:cNvPr id="3" name="Content Placeholder 2">
-            <a:extLst>
-              <a:ext uri="{FF2B5EF4-FFF2-40B4-BE49-F238E27FC236}">
-                <a16:creationId xmlns:a16="http://schemas.microsoft.com/office/drawing/2014/main" id="{0874D5B9-99A5-404C-B507-E2DB9E45D7D9}"/>
-              </a:ext>
-            </a:extLst>
-          </p:cNvPr>
-          <p:cNvSpPr>
-            <a:spLocks noGrp="1"/>
-          </p:cNvSpPr>
-          <p:nvPr>
-            <p:ph idx="1"/>
-          </p:nvPr>
-        </p:nvSpPr>
-        <p:spPr/>
-        <p:txBody>
-          <a:bodyPr/>
-          <a:lstStyle/>
-          <a:p>
-            <a:r>
-              <a:rPr lang="en-CA" dirty="0"/>
-              <a:t>You can define more class attributes within a tag</a:t>
-            </a:r>
-          </a:p>
-          <a:p>
-            <a:pPr lvl="1"/>
-            <a:r>
-              <a:rPr lang="en-CA" dirty="0"/>
-              <a:t>You just need to space each class out</a:t>
-            </a:r>
-          </a:p>
-          <a:p>
-            <a:r>
-              <a:rPr lang="en-CA" dirty="0"/>
-              <a:t>Let’s take a look at an example</a:t>
-            </a:r>
-          </a:p>
-          <a:p>
-            <a:pPr marL="0" indent="0" algn="ctr">
-              <a:buNone/>
-            </a:pPr>
-            <a:r>
-              <a:rPr lang="en-CA" i="1" dirty="0"/>
-              <a:t>&lt;form class=“</a:t>
-            </a:r>
-            <a:r>
-              <a:rPr lang="en-CA" i="1" dirty="0" err="1"/>
-              <a:t>formClass</a:t>
-            </a:r>
-            <a:r>
-              <a:rPr lang="en-CA" i="1" dirty="0"/>
-              <a:t> </a:t>
-            </a:r>
-            <a:r>
-              <a:rPr lang="en-CA" i="1" dirty="0" err="1"/>
-              <a:t>registrationForm</a:t>
-            </a:r>
-            <a:r>
-              <a:rPr lang="en-CA" i="1" dirty="0"/>
-              <a:t>”&gt; … &lt;/form&gt;</a:t>
-            </a:r>
-          </a:p>
-          <a:p>
-            <a:endParaRPr lang="en-CA" dirty="0"/>
-          </a:p>
-        </p:txBody>
-      </p:sp>
-    </p:spTree>
-    <p:extLst>
-      <p:ext uri="{BB962C8B-B14F-4D97-AF65-F5344CB8AC3E}">
-        <p14:creationId xmlns:p14="http://schemas.microsoft.com/office/powerpoint/2010/main" val="1245823957"/>
-      </p:ext>
-    </p:extLst>
-  </p:cSld>
-  <p:clrMapOvr>
-    <a:masterClrMapping/>
-  </p:clrMapOvr>
-</p:sld>
-</file>
-
-<file path=ppt/slides/slide2.xml><?xml version="1.0" encoding="utf-8"?>
-<p:sld xmlns:a="http://schemas.openxmlformats.org/drawingml/2006/main" xmlns:r="http://schemas.openxmlformats.org/officeDocument/2006/relationships" xmlns:p="http://schemas.openxmlformats.org/presentationml/2006/main">
-  <p:cSld>
-    <p:spTree>
-      <p:nvGrpSpPr>
-        <p:cNvPr id="1" name=""/>
-        <p:cNvGrpSpPr/>
-        <p:nvPr/>
-      </p:nvGrpSpPr>
-      <p:grpSpPr>
-        <a:xfrm>
-          <a:off x="0" y="0"/>
-          <a:ext cx="0" cy="0"/>
-          <a:chOff x="0" y="0"/>
-          <a:chExt cx="0" cy="0"/>
-        </a:xfrm>
-      </p:grpSpPr>
-      <p:sp>
-        <p:nvSpPr>
-          <p:cNvPr id="2" name="Title 1">
-            <a:extLst>
-              <a:ext uri="{FF2B5EF4-FFF2-40B4-BE49-F238E27FC236}">
-                <a16:creationId xmlns:a16="http://schemas.microsoft.com/office/drawing/2014/main" id="{F3D7348F-85A1-4EC9-B8BF-441BD46994E0}"/>
-              </a:ext>
-            </a:extLst>
-          </p:cNvPr>
-          <p:cNvSpPr>
-            <a:spLocks noGrp="1"/>
-          </p:cNvSpPr>
-          <p:nvPr>
-            <p:ph type="title"/>
-          </p:nvPr>
-        </p:nvSpPr>
-        <p:spPr/>
-        <p:txBody>
-          <a:bodyPr/>
-          <a:lstStyle/>
-          <a:p>
-            <a:r>
-              <a:rPr lang="en-CA" dirty="0"/>
-              <a:t>Welcome Back!</a:t>
-            </a:r>
-          </a:p>
-        </p:txBody>
-      </p:sp>
-      <p:sp>
-        <p:nvSpPr>
-          <p:cNvPr id="3" name="Content Placeholder 2">
-            <a:extLst>
-              <a:ext uri="{FF2B5EF4-FFF2-40B4-BE49-F238E27FC236}">
-                <a16:creationId xmlns:a16="http://schemas.microsoft.com/office/drawing/2014/main" id="{B25ED2B4-C36E-4DF1-AC2B-8A01F793B943}"/>
-              </a:ext>
-            </a:extLst>
-          </p:cNvPr>
-          <p:cNvSpPr>
-            <a:spLocks noGrp="1"/>
-          </p:cNvSpPr>
-          <p:nvPr>
-            <p:ph idx="1"/>
-          </p:nvPr>
-        </p:nvSpPr>
-        <p:spPr>
-          <a:xfrm>
-            <a:off x="1202919" y="1859280"/>
-            <a:ext cx="9784080" cy="4206240"/>
-          </a:xfrm>
-        </p:spPr>
-        <p:txBody>
-          <a:bodyPr/>
-          <a:lstStyle/>
-          <a:p>
-            <a:r>
-              <a:rPr lang="en-CA" dirty="0"/>
-              <a:t>Hope that your week went well!</a:t>
-            </a:r>
-          </a:p>
-          <a:p>
-            <a:endParaRPr lang="en-CA" dirty="0"/>
-          </a:p>
-        </p:txBody>
-      </p:sp>
-      <p:sp>
-        <p:nvSpPr>
-          <p:cNvPr id="4" name="AutoShape 2" descr="Image result for Enjoy meme">
-            <a:extLst>
-              <a:ext uri="{FF2B5EF4-FFF2-40B4-BE49-F238E27FC236}">
-                <a16:creationId xmlns:a16="http://schemas.microsoft.com/office/drawing/2014/main" id="{3DBA598A-F250-4F94-96D0-090C417B6C56}"/>
-              </a:ext>
-            </a:extLst>
-          </p:cNvPr>
-          <p:cNvSpPr>
-            <a:spLocks noChangeAspect="1" noChangeArrowheads="1"/>
-          </p:cNvSpPr>
-          <p:nvPr/>
-        </p:nvSpPr>
-        <p:spPr bwMode="auto">
-          <a:xfrm>
-            <a:off x="5943600" y="3276600"/>
-            <a:ext cx="304800" cy="304800"/>
-          </a:xfrm>
-          <a:prstGeom prst="rect">
-            <a:avLst/>
-          </a:prstGeom>
-          <a:noFill/>
-          <a:extLst>
-            <a:ext uri="{909E8E84-426E-40DD-AFC4-6F175D3DCCD1}">
-              <a14:hiddenFill xmlns:a14="http://schemas.microsoft.com/office/drawing/2010/main">
-                <a:solidFill>
-                  <a:srgbClr val="FFFFFF"/>
-                </a:solidFill>
-              </a14:hiddenFill>
-            </a:ext>
-          </a:extLst>
-        </p:spPr>
-        <p:txBody>
-          <a:bodyPr vert="horz" wrap="square" lIns="91440" tIns="45720" rIns="91440" bIns="45720" numCol="1" anchor="t" anchorCtr="0" compatLnSpc="1">
-            <a:prstTxWarp prst="textNoShape">
-              <a:avLst/>
-            </a:prstTxWarp>
-          </a:bodyPr>
-          <a:lstStyle/>
-          <a:p>
-            <a:endParaRPr lang="en-CA"/>
-          </a:p>
-        </p:txBody>
-      </p:sp>
-      <p:pic>
-        <p:nvPicPr>
-          <p:cNvPr id="1026" name="Picture 2" descr="Image result for Welcome back meme">
-            <a:extLst>
-              <a:ext uri="{FF2B5EF4-FFF2-40B4-BE49-F238E27FC236}">
-                <a16:creationId xmlns:a16="http://schemas.microsoft.com/office/drawing/2014/main" id="{BC2F5CF0-4838-4571-90C7-533E1B49809E}"/>
+                <a16:creationId xmlns:a16="http://schemas.microsoft.com/office/drawing/2014/main" id="{4EC9280F-2B30-4025-9884-9770FB88BBD8}"/>
               </a:ext>
             </a:extLst>
           </p:cNvPr>
@@ -4950,1546 +3594,8 @@
         </p:blipFill>
         <p:spPr bwMode="auto">
           <a:xfrm>
-            <a:off x="4189959" y="2540000"/>
-            <a:ext cx="3810000" cy="3810000"/>
-          </a:xfrm>
-          <a:prstGeom prst="rect">
-            <a:avLst/>
-          </a:prstGeom>
-          <a:noFill/>
-          <a:extLst>
-            <a:ext uri="{909E8E84-426E-40DD-AFC4-6F175D3DCCD1}">
-              <a14:hiddenFill xmlns:a14="http://schemas.microsoft.com/office/drawing/2010/main">
-                <a:solidFill>
-                  <a:srgbClr val="FFFFFF"/>
-                </a:solidFill>
-              </a14:hiddenFill>
-            </a:ext>
-          </a:extLst>
-        </p:spPr>
-      </p:pic>
-      <p:pic>
-        <p:nvPicPr>
-          <p:cNvPr id="1028" name="Picture 4" descr="Image result for Welcome back meme">
-            <a:extLst>
-              <a:ext uri="{FF2B5EF4-FFF2-40B4-BE49-F238E27FC236}">
-                <a16:creationId xmlns:a16="http://schemas.microsoft.com/office/drawing/2014/main" id="{375CE871-090D-4A6A-8D0E-DE8281226955}"/>
-              </a:ext>
-            </a:extLst>
-          </p:cNvPr>
-          <p:cNvPicPr>
-            <a:picLocks noChangeAspect="1" noChangeArrowheads="1"/>
-          </p:cNvPicPr>
-          <p:nvPr/>
-        </p:nvPicPr>
-        <p:blipFill>
-          <a:blip r:embed="rId3">
-            <a:extLst>
-              <a:ext uri="{28A0092B-C50C-407E-A947-70E740481C1C}">
-                <a14:useLocalDpi xmlns:a14="http://schemas.microsoft.com/office/drawing/2010/main" val="0"/>
-              </a:ext>
-            </a:extLst>
-          </a:blip>
-          <a:srcRect/>
-          <a:stretch>
-            <a:fillRect/>
-          </a:stretch>
-        </p:blipFill>
-        <p:spPr bwMode="auto">
-          <a:xfrm>
-            <a:off x="4189959" y="2540000"/>
-            <a:ext cx="3810000" cy="3810000"/>
-          </a:xfrm>
-          <a:prstGeom prst="rect">
-            <a:avLst/>
-          </a:prstGeom>
-          <a:noFill/>
-          <a:extLst>
-            <a:ext uri="{909E8E84-426E-40DD-AFC4-6F175D3DCCD1}">
-              <a14:hiddenFill xmlns:a14="http://schemas.microsoft.com/office/drawing/2010/main">
-                <a:solidFill>
-                  <a:srgbClr val="FFFFFF"/>
-                </a:solidFill>
-              </a14:hiddenFill>
-            </a:ext>
-          </a:extLst>
-        </p:spPr>
-      </p:pic>
-    </p:spTree>
-    <p:extLst>
-      <p:ext uri="{BB962C8B-B14F-4D97-AF65-F5344CB8AC3E}">
-        <p14:creationId xmlns:p14="http://schemas.microsoft.com/office/powerpoint/2010/main" val="637461931"/>
-      </p:ext>
-    </p:extLst>
-  </p:cSld>
-  <p:clrMapOvr>
-    <a:masterClrMapping/>
-  </p:clrMapOvr>
-  <p:timing>
-    <p:tnLst>
-      <p:par>
-        <p:cTn id="1" dur="indefinite" restart="never" nodeType="tmRoot">
-          <p:childTnLst>
-            <p:seq concurrent="1" nextAc="seek">
-              <p:cTn id="2" dur="indefinite" nodeType="mainSeq">
-                <p:childTnLst>
-                  <p:par>
-                    <p:cTn id="3" fill="hold">
-                      <p:stCondLst>
-                        <p:cond delay="indefinite"/>
-                      </p:stCondLst>
-                      <p:childTnLst>
-                        <p:par>
-                          <p:cTn id="4" fill="hold">
-                            <p:stCondLst>
-                              <p:cond delay="0"/>
-                            </p:stCondLst>
-                            <p:childTnLst>
-                              <p:par>
-                                <p:cTn id="5" presetID="10" presetClass="entr" presetSubtype="0" fill="hold" nodeType="clickEffect">
-                                  <p:stCondLst>
-                                    <p:cond delay="0"/>
-                                  </p:stCondLst>
-                                  <p:childTnLst>
-                                    <p:set>
-                                      <p:cBhvr>
-                                        <p:cTn id="6" dur="1" fill="hold">
-                                          <p:stCondLst>
-                                            <p:cond delay="0"/>
-                                          </p:stCondLst>
-                                        </p:cTn>
-                                        <p:tgtEl>
-                                          <p:spTgt spid="1026"/>
-                                        </p:tgtEl>
-                                        <p:attrNameLst>
-                                          <p:attrName>style.visibility</p:attrName>
-                                        </p:attrNameLst>
-                                      </p:cBhvr>
-                                      <p:to>
-                                        <p:strVal val="visible"/>
-                                      </p:to>
-                                    </p:set>
-                                    <p:animEffect transition="in" filter="fade">
-                                      <p:cBhvr>
-                                        <p:cTn id="7" dur="500"/>
-                                        <p:tgtEl>
-                                          <p:spTgt spid="1026"/>
-                                        </p:tgtEl>
-                                      </p:cBhvr>
-                                    </p:animEffect>
-                                  </p:childTnLst>
-                                </p:cTn>
-                              </p:par>
-                            </p:childTnLst>
-                          </p:cTn>
-                        </p:par>
-                      </p:childTnLst>
-                    </p:cTn>
-                  </p:par>
-                  <p:par>
-                    <p:cTn id="8" fill="hold">
-                      <p:stCondLst>
-                        <p:cond delay="indefinite"/>
-                      </p:stCondLst>
-                      <p:childTnLst>
-                        <p:par>
-                          <p:cTn id="9" fill="hold">
-                            <p:stCondLst>
-                              <p:cond delay="0"/>
-                            </p:stCondLst>
-                            <p:childTnLst>
-                              <p:par>
-                                <p:cTn id="10" presetID="16" presetClass="entr" presetSubtype="21" fill="hold" nodeType="clickEffect">
-                                  <p:stCondLst>
-                                    <p:cond delay="0"/>
-                                  </p:stCondLst>
-                                  <p:childTnLst>
-                                    <p:set>
-                                      <p:cBhvr>
-                                        <p:cTn id="11" dur="1" fill="hold">
-                                          <p:stCondLst>
-                                            <p:cond delay="0"/>
-                                          </p:stCondLst>
-                                        </p:cTn>
-                                        <p:tgtEl>
-                                          <p:spTgt spid="1028"/>
-                                        </p:tgtEl>
-                                        <p:attrNameLst>
-                                          <p:attrName>style.visibility</p:attrName>
-                                        </p:attrNameLst>
-                                      </p:cBhvr>
-                                      <p:to>
-                                        <p:strVal val="visible"/>
-                                      </p:to>
-                                    </p:set>
-                                    <p:animEffect transition="in" filter="barn(inVertical)">
-                                      <p:cBhvr>
-                                        <p:cTn id="12" dur="500"/>
-                                        <p:tgtEl>
-                                          <p:spTgt spid="1028"/>
-                                        </p:tgtEl>
-                                      </p:cBhvr>
-                                    </p:animEffect>
-                                  </p:childTnLst>
-                                </p:cTn>
-                              </p:par>
-                            </p:childTnLst>
-                          </p:cTn>
-                        </p:par>
-                      </p:childTnLst>
-                    </p:cTn>
-                  </p:par>
-                </p:childTnLst>
-              </p:cTn>
-              <p:prevCondLst>
-                <p:cond evt="onPrev" delay="0">
-                  <p:tgtEl>
-                    <p:sldTgt/>
-                  </p:tgtEl>
-                </p:cond>
-              </p:prevCondLst>
-              <p:nextCondLst>
-                <p:cond evt="onNext" delay="0">
-                  <p:tgtEl>
-                    <p:sldTgt/>
-                  </p:tgtEl>
-                </p:cond>
-              </p:nextCondLst>
-            </p:seq>
-          </p:childTnLst>
-        </p:cTn>
-      </p:par>
-    </p:tnLst>
-  </p:timing>
-</p:sld>
-</file>
-
-<file path=ppt/slides/slide20.xml><?xml version="1.0" encoding="utf-8"?>
-<p:sld xmlns:a="http://schemas.openxmlformats.org/drawingml/2006/main" xmlns:r="http://schemas.openxmlformats.org/officeDocument/2006/relationships" xmlns:p="http://schemas.openxmlformats.org/presentationml/2006/main">
-  <p:cSld>
-    <p:spTree>
-      <p:nvGrpSpPr>
-        <p:cNvPr id="1" name=""/>
-        <p:cNvGrpSpPr/>
-        <p:nvPr/>
-      </p:nvGrpSpPr>
-      <p:grpSpPr>
-        <a:xfrm>
-          <a:off x="0" y="0"/>
-          <a:ext cx="0" cy="0"/>
-          <a:chOff x="0" y="0"/>
-          <a:chExt cx="0" cy="0"/>
-        </a:xfrm>
-      </p:grpSpPr>
-      <p:sp>
-        <p:nvSpPr>
-          <p:cNvPr id="2" name="Title 1">
-            <a:extLst>
-              <a:ext uri="{FF2B5EF4-FFF2-40B4-BE49-F238E27FC236}">
-                <a16:creationId xmlns:a16="http://schemas.microsoft.com/office/drawing/2014/main" id="{FD4CC6C4-B889-42E4-BA31-28441A814021}"/>
-              </a:ext>
-            </a:extLst>
-          </p:cNvPr>
-          <p:cNvSpPr>
-            <a:spLocks noGrp="1"/>
-          </p:cNvSpPr>
-          <p:nvPr>
-            <p:ph type="title"/>
-          </p:nvPr>
-        </p:nvSpPr>
-        <p:spPr/>
-        <p:txBody>
-          <a:bodyPr/>
-          <a:lstStyle/>
-          <a:p>
-            <a:r>
-              <a:rPr lang="en-CA" dirty="0"/>
-              <a:t>Going back to HTML basics… Attributes (3)</a:t>
-            </a:r>
-          </a:p>
-        </p:txBody>
-      </p:sp>
-      <p:sp>
-        <p:nvSpPr>
-          <p:cNvPr id="3" name="Content Placeholder 2">
-            <a:extLst>
-              <a:ext uri="{FF2B5EF4-FFF2-40B4-BE49-F238E27FC236}">
-                <a16:creationId xmlns:a16="http://schemas.microsoft.com/office/drawing/2014/main" id="{0874D5B9-99A5-404C-B507-E2DB9E45D7D9}"/>
-              </a:ext>
-            </a:extLst>
-          </p:cNvPr>
-          <p:cNvSpPr>
-            <a:spLocks noGrp="1"/>
-          </p:cNvSpPr>
-          <p:nvPr>
-            <p:ph idx="1"/>
-          </p:nvPr>
-        </p:nvSpPr>
-        <p:spPr/>
-        <p:txBody>
-          <a:bodyPr/>
-          <a:lstStyle/>
-          <a:p>
-            <a:r>
-              <a:rPr lang="en-CA" dirty="0"/>
-              <a:t>How about ID attributes?</a:t>
-            </a:r>
-          </a:p>
-          <a:p>
-            <a:pPr lvl="1"/>
-            <a:r>
-              <a:rPr lang="en-CA" i="1" dirty="0"/>
-              <a:t>ID</a:t>
-            </a:r>
-            <a:r>
-              <a:rPr lang="en-CA" dirty="0"/>
-              <a:t> attributes on HTML are unique identifiers</a:t>
-            </a:r>
-          </a:p>
-          <a:p>
-            <a:pPr lvl="1"/>
-            <a:r>
-              <a:rPr lang="en-CA" dirty="0"/>
-              <a:t>Although they might be similar to class attributes, these aren’t your typical attributes that you can mess around with</a:t>
-            </a:r>
-          </a:p>
-          <a:p>
-            <a:pPr lvl="1"/>
-            <a:r>
-              <a:rPr lang="en-CA" dirty="0"/>
-              <a:t>When an HTML tag has an ID attribute, you can add uniqueness to your element</a:t>
-            </a:r>
-          </a:p>
-          <a:p>
-            <a:pPr lvl="2"/>
-            <a:r>
-              <a:rPr lang="en-CA" dirty="0"/>
-              <a:t>This happens when you have too many of the same HTML tag that has different content</a:t>
-            </a:r>
-          </a:p>
-          <a:p>
-            <a:pPr lvl="2"/>
-            <a:r>
-              <a:rPr lang="en-CA" dirty="0"/>
-              <a:t>It can also be used when you are using the same class attribute value many times over</a:t>
-            </a:r>
-          </a:p>
-          <a:p>
-            <a:pPr lvl="2"/>
-            <a:r>
-              <a:rPr lang="en-CA" dirty="0"/>
-              <a:t>It helps distinguish ambiguity when you stylize certain content or add functionality to certain content</a:t>
-            </a:r>
-          </a:p>
-          <a:p>
-            <a:r>
-              <a:rPr lang="en-CA" dirty="0"/>
-              <a:t>What does an id look like?</a:t>
-            </a:r>
-          </a:p>
-          <a:p>
-            <a:pPr marL="0" indent="0" algn="ctr">
-              <a:buNone/>
-            </a:pPr>
-            <a:r>
-              <a:rPr lang="en-CA" i="1" dirty="0"/>
-              <a:t>&lt;div id=“</a:t>
-            </a:r>
-            <a:r>
-              <a:rPr lang="en-CA" i="1" dirty="0" err="1"/>
-              <a:t>anId</a:t>
-            </a:r>
-            <a:r>
-              <a:rPr lang="en-CA" i="1" dirty="0"/>
-              <a:t>”&gt; … &lt;/div&gt;</a:t>
-            </a:r>
-          </a:p>
-          <a:p>
-            <a:pPr lvl="1"/>
-            <a:endParaRPr lang="en-CA" dirty="0"/>
-          </a:p>
-          <a:p>
-            <a:endParaRPr lang="en-CA" dirty="0"/>
-          </a:p>
-        </p:txBody>
-      </p:sp>
-    </p:spTree>
-    <p:extLst>
-      <p:ext uri="{BB962C8B-B14F-4D97-AF65-F5344CB8AC3E}">
-        <p14:creationId xmlns:p14="http://schemas.microsoft.com/office/powerpoint/2010/main" val="4159299237"/>
-      </p:ext>
-    </p:extLst>
-  </p:cSld>
-  <p:clrMapOvr>
-    <a:masterClrMapping/>
-  </p:clrMapOvr>
-</p:sld>
-</file>
-
-<file path=ppt/slides/slide21.xml><?xml version="1.0" encoding="utf-8"?>
-<p:sld xmlns:a="http://schemas.openxmlformats.org/drawingml/2006/main" xmlns:r="http://schemas.openxmlformats.org/officeDocument/2006/relationships" xmlns:p="http://schemas.openxmlformats.org/presentationml/2006/main">
-  <p:cSld>
-    <p:spTree>
-      <p:nvGrpSpPr>
-        <p:cNvPr id="1" name=""/>
-        <p:cNvGrpSpPr/>
-        <p:nvPr/>
-      </p:nvGrpSpPr>
-      <p:grpSpPr>
-        <a:xfrm>
-          <a:off x="0" y="0"/>
-          <a:ext cx="0" cy="0"/>
-          <a:chOff x="0" y="0"/>
-          <a:chExt cx="0" cy="0"/>
-        </a:xfrm>
-      </p:grpSpPr>
-      <p:sp>
-        <p:nvSpPr>
-          <p:cNvPr id="2" name="Title 1">
-            <a:extLst>
-              <a:ext uri="{FF2B5EF4-FFF2-40B4-BE49-F238E27FC236}">
-                <a16:creationId xmlns:a16="http://schemas.microsoft.com/office/drawing/2014/main" id="{FD4CC6C4-B889-42E4-BA31-28441A814021}"/>
-              </a:ext>
-            </a:extLst>
-          </p:cNvPr>
-          <p:cNvSpPr>
-            <a:spLocks noGrp="1"/>
-          </p:cNvSpPr>
-          <p:nvPr>
-            <p:ph type="title"/>
-          </p:nvPr>
-        </p:nvSpPr>
-        <p:spPr/>
-        <p:txBody>
-          <a:bodyPr/>
-          <a:lstStyle/>
-          <a:p>
-            <a:r>
-              <a:rPr lang="en-CA" dirty="0"/>
-              <a:t>Going back to HTML basics… Attributes (4)</a:t>
-            </a:r>
-          </a:p>
-        </p:txBody>
-      </p:sp>
-      <p:sp>
-        <p:nvSpPr>
-          <p:cNvPr id="3" name="Content Placeholder 2">
-            <a:extLst>
-              <a:ext uri="{FF2B5EF4-FFF2-40B4-BE49-F238E27FC236}">
-                <a16:creationId xmlns:a16="http://schemas.microsoft.com/office/drawing/2014/main" id="{0874D5B9-99A5-404C-B507-E2DB9E45D7D9}"/>
-              </a:ext>
-            </a:extLst>
-          </p:cNvPr>
-          <p:cNvSpPr>
-            <a:spLocks noGrp="1"/>
-          </p:cNvSpPr>
-          <p:nvPr>
-            <p:ph idx="1"/>
-          </p:nvPr>
-        </p:nvSpPr>
-        <p:spPr/>
-        <p:txBody>
-          <a:bodyPr/>
-          <a:lstStyle/>
-          <a:p>
-            <a:r>
-              <a:rPr lang="en-CA" dirty="0"/>
-              <a:t>You can combine class and ID attributes:</a:t>
-            </a:r>
-          </a:p>
-          <a:p>
-            <a:pPr marL="0" indent="0" algn="ctr">
-              <a:buNone/>
-            </a:pPr>
-            <a:r>
-              <a:rPr lang="en-CA" i="1" dirty="0"/>
-              <a:t>&lt;p class=“</a:t>
-            </a:r>
-            <a:r>
-              <a:rPr lang="en-CA" i="1" dirty="0" err="1"/>
-              <a:t>majorInfo</a:t>
-            </a:r>
-            <a:r>
-              <a:rPr lang="en-CA" i="1" dirty="0"/>
-              <a:t>” id=“intro”&gt; … &lt;/p&gt;</a:t>
-            </a:r>
-          </a:p>
-          <a:p>
-            <a:pPr marL="0" indent="0" algn="ctr">
-              <a:buNone/>
-            </a:pPr>
-            <a:r>
-              <a:rPr lang="en-CA" i="1" dirty="0"/>
-              <a:t>&lt;div class=“</a:t>
-            </a:r>
-            <a:r>
-              <a:rPr lang="en-CA" i="1" dirty="0" err="1"/>
-              <a:t>majorInfo</a:t>
-            </a:r>
-            <a:r>
-              <a:rPr lang="en-CA" i="1" dirty="0"/>
-              <a:t>” id=“data”&gt; … &lt;/p&gt;</a:t>
-            </a:r>
-          </a:p>
-        </p:txBody>
-      </p:sp>
-    </p:spTree>
-    <p:extLst>
-      <p:ext uri="{BB962C8B-B14F-4D97-AF65-F5344CB8AC3E}">
-        <p14:creationId xmlns:p14="http://schemas.microsoft.com/office/powerpoint/2010/main" val="2873824352"/>
-      </p:ext>
-    </p:extLst>
-  </p:cSld>
-  <p:clrMapOvr>
-    <a:masterClrMapping/>
-  </p:clrMapOvr>
-</p:sld>
-</file>
-
-<file path=ppt/slides/slide22.xml><?xml version="1.0" encoding="utf-8"?>
-<p:sld xmlns:a="http://schemas.openxmlformats.org/drawingml/2006/main" xmlns:r="http://schemas.openxmlformats.org/officeDocument/2006/relationships" xmlns:p="http://schemas.openxmlformats.org/presentationml/2006/main">
-  <p:cSld>
-    <p:spTree>
-      <p:nvGrpSpPr>
-        <p:cNvPr id="1" name=""/>
-        <p:cNvGrpSpPr/>
-        <p:nvPr/>
-      </p:nvGrpSpPr>
-      <p:grpSpPr>
-        <a:xfrm>
-          <a:off x="0" y="0"/>
-          <a:ext cx="0" cy="0"/>
-          <a:chOff x="0" y="0"/>
-          <a:chExt cx="0" cy="0"/>
-        </a:xfrm>
-      </p:grpSpPr>
-      <p:sp>
-        <p:nvSpPr>
-          <p:cNvPr id="2" name="Title 1">
-            <a:extLst>
-              <a:ext uri="{FF2B5EF4-FFF2-40B4-BE49-F238E27FC236}">
-                <a16:creationId xmlns:a16="http://schemas.microsoft.com/office/drawing/2014/main" id="{FD4CC6C4-B889-42E4-BA31-28441A814021}"/>
-              </a:ext>
-            </a:extLst>
-          </p:cNvPr>
-          <p:cNvSpPr>
-            <a:spLocks noGrp="1"/>
-          </p:cNvSpPr>
-          <p:nvPr>
-            <p:ph type="title"/>
-          </p:nvPr>
-        </p:nvSpPr>
-        <p:spPr/>
-        <p:txBody>
-          <a:bodyPr/>
-          <a:lstStyle/>
-          <a:p>
-            <a:r>
-              <a:rPr lang="en-CA" dirty="0"/>
-              <a:t>How are attributes referred to inside &lt;style&gt; tags?</a:t>
-            </a:r>
-          </a:p>
-        </p:txBody>
-      </p:sp>
-      <p:sp>
-        <p:nvSpPr>
-          <p:cNvPr id="3" name="Content Placeholder 2">
-            <a:extLst>
-              <a:ext uri="{FF2B5EF4-FFF2-40B4-BE49-F238E27FC236}">
-                <a16:creationId xmlns:a16="http://schemas.microsoft.com/office/drawing/2014/main" id="{0874D5B9-99A5-404C-B507-E2DB9E45D7D9}"/>
-              </a:ext>
-            </a:extLst>
-          </p:cNvPr>
-          <p:cNvSpPr>
-            <a:spLocks noGrp="1"/>
-          </p:cNvSpPr>
-          <p:nvPr>
-            <p:ph idx="1"/>
-          </p:nvPr>
-        </p:nvSpPr>
-        <p:spPr/>
-        <p:txBody>
-          <a:bodyPr/>
-          <a:lstStyle/>
-          <a:p>
-            <a:r>
-              <a:rPr lang="en-CA" dirty="0"/>
-              <a:t>When you use &lt;style&gt; tags (and CSS! More on that later) on attributes, you must do the following:</a:t>
-            </a:r>
-          </a:p>
-          <a:p>
-            <a:pPr lvl="1"/>
-            <a:r>
-              <a:rPr lang="en-CA" i="1" dirty="0"/>
-              <a:t>.[class name] </a:t>
-            </a:r>
-            <a:endParaRPr lang="en-CA" dirty="0"/>
-          </a:p>
-          <a:p>
-            <a:pPr lvl="1"/>
-            <a:r>
-              <a:rPr lang="en-CA" i="1" dirty="0"/>
-              <a:t>#[id name]</a:t>
-            </a:r>
-            <a:endParaRPr lang="en-CA" dirty="0"/>
-          </a:p>
-          <a:p>
-            <a:r>
-              <a:rPr lang="en-CA" dirty="0"/>
-              <a:t>These specify what you want to stylize (as mentioned moments ago)</a:t>
-            </a:r>
-          </a:p>
-        </p:txBody>
-      </p:sp>
-    </p:spTree>
-    <p:extLst>
-      <p:ext uri="{BB962C8B-B14F-4D97-AF65-F5344CB8AC3E}">
-        <p14:creationId xmlns:p14="http://schemas.microsoft.com/office/powerpoint/2010/main" val="2430799376"/>
-      </p:ext>
-    </p:extLst>
-  </p:cSld>
-  <p:clrMapOvr>
-    <a:masterClrMapping/>
-  </p:clrMapOvr>
-</p:sld>
-</file>
-
-<file path=ppt/slides/slide23.xml><?xml version="1.0" encoding="utf-8"?>
-<p:sld xmlns:a="http://schemas.openxmlformats.org/drawingml/2006/main" xmlns:r="http://schemas.openxmlformats.org/officeDocument/2006/relationships" xmlns:p="http://schemas.openxmlformats.org/presentationml/2006/main">
-  <p:cSld>
-    <p:spTree>
-      <p:nvGrpSpPr>
-        <p:cNvPr id="1" name=""/>
-        <p:cNvGrpSpPr/>
-        <p:nvPr/>
-      </p:nvGrpSpPr>
-      <p:grpSpPr>
-        <a:xfrm>
-          <a:off x="0" y="0"/>
-          <a:ext cx="0" cy="0"/>
-          <a:chOff x="0" y="0"/>
-          <a:chExt cx="0" cy="0"/>
-        </a:xfrm>
-      </p:grpSpPr>
-      <p:sp>
-        <p:nvSpPr>
-          <p:cNvPr id="2" name="Title 1">
-            <a:extLst>
-              <a:ext uri="{FF2B5EF4-FFF2-40B4-BE49-F238E27FC236}">
-                <a16:creationId xmlns:a16="http://schemas.microsoft.com/office/drawing/2014/main" id="{FD4CC6C4-B889-42E4-BA31-28441A814021}"/>
-              </a:ext>
-            </a:extLst>
-          </p:cNvPr>
-          <p:cNvSpPr>
-            <a:spLocks noGrp="1"/>
-          </p:cNvSpPr>
-          <p:nvPr>
-            <p:ph type="title"/>
-          </p:nvPr>
-        </p:nvSpPr>
-        <p:spPr/>
-        <p:txBody>
-          <a:bodyPr/>
-          <a:lstStyle/>
-          <a:p>
-            <a:r>
-              <a:rPr lang="en-CA" dirty="0"/>
-              <a:t>What about tags that allow the “style” parameter?</a:t>
-            </a:r>
-          </a:p>
-        </p:txBody>
-      </p:sp>
-      <p:sp>
-        <p:nvSpPr>
-          <p:cNvPr id="3" name="Content Placeholder 2">
-            <a:extLst>
-              <a:ext uri="{FF2B5EF4-FFF2-40B4-BE49-F238E27FC236}">
-                <a16:creationId xmlns:a16="http://schemas.microsoft.com/office/drawing/2014/main" id="{0874D5B9-99A5-404C-B507-E2DB9E45D7D9}"/>
-              </a:ext>
-            </a:extLst>
-          </p:cNvPr>
-          <p:cNvSpPr>
-            <a:spLocks noGrp="1"/>
-          </p:cNvSpPr>
-          <p:nvPr>
-            <p:ph idx="1"/>
-          </p:nvPr>
-        </p:nvSpPr>
-        <p:spPr/>
-        <p:txBody>
-          <a:bodyPr/>
-          <a:lstStyle/>
-          <a:p>
-            <a:r>
-              <a:rPr lang="en-CA" dirty="0" err="1"/>
-              <a:t>asdf</a:t>
-            </a:r>
-            <a:endParaRPr lang="en-CA" dirty="0"/>
-          </a:p>
-        </p:txBody>
-      </p:sp>
-    </p:spTree>
-    <p:extLst>
-      <p:ext uri="{BB962C8B-B14F-4D97-AF65-F5344CB8AC3E}">
-        <p14:creationId xmlns:p14="http://schemas.microsoft.com/office/powerpoint/2010/main" val="2766973661"/>
-      </p:ext>
-    </p:extLst>
-  </p:cSld>
-  <p:clrMapOvr>
-    <a:masterClrMapping/>
-  </p:clrMapOvr>
-</p:sld>
-</file>
-
-<file path=ppt/slides/slide24.xml><?xml version="1.0" encoding="utf-8"?>
-<p:sld xmlns:a="http://schemas.openxmlformats.org/drawingml/2006/main" xmlns:r="http://schemas.openxmlformats.org/officeDocument/2006/relationships" xmlns:p="http://schemas.openxmlformats.org/presentationml/2006/main">
-  <p:cSld>
-    <p:spTree>
-      <p:nvGrpSpPr>
-        <p:cNvPr id="1" name=""/>
-        <p:cNvGrpSpPr/>
-        <p:nvPr/>
-      </p:nvGrpSpPr>
-      <p:grpSpPr>
-        <a:xfrm>
-          <a:off x="0" y="0"/>
-          <a:ext cx="0" cy="0"/>
-          <a:chOff x="0" y="0"/>
-          <a:chExt cx="0" cy="0"/>
-        </a:xfrm>
-      </p:grpSpPr>
-      <p:sp>
-        <p:nvSpPr>
-          <p:cNvPr id="2" name="Title 1">
-            <a:extLst>
-              <a:ext uri="{FF2B5EF4-FFF2-40B4-BE49-F238E27FC236}">
-                <a16:creationId xmlns:a16="http://schemas.microsoft.com/office/drawing/2014/main" id="{FD4CC6C4-B889-42E4-BA31-28441A814021}"/>
-              </a:ext>
-            </a:extLst>
-          </p:cNvPr>
-          <p:cNvSpPr>
-            <a:spLocks noGrp="1"/>
-          </p:cNvSpPr>
-          <p:nvPr>
-            <p:ph type="title"/>
-          </p:nvPr>
-        </p:nvSpPr>
-        <p:spPr/>
-        <p:txBody>
-          <a:bodyPr/>
-          <a:lstStyle/>
-          <a:p>
-            <a:r>
-              <a:rPr lang="en-CA" dirty="0"/>
-              <a:t>Break #1</a:t>
-            </a:r>
-          </a:p>
-        </p:txBody>
-      </p:sp>
-      <p:pic>
-        <p:nvPicPr>
-          <p:cNvPr id="4098" name="Picture 2" descr="Image result for Style memes">
-            <a:extLst>
-              <a:ext uri="{FF2B5EF4-FFF2-40B4-BE49-F238E27FC236}">
-                <a16:creationId xmlns:a16="http://schemas.microsoft.com/office/drawing/2014/main" id="{3890B522-8ADA-428C-8FEB-DC9B0F84A81E}"/>
-              </a:ext>
-            </a:extLst>
-          </p:cNvPr>
-          <p:cNvPicPr>
-            <a:picLocks noGrp="1" noChangeAspect="1" noChangeArrowheads="1"/>
-          </p:cNvPicPr>
-          <p:nvPr>
-            <p:ph idx="1"/>
-          </p:nvPr>
-        </p:nvPicPr>
-        <p:blipFill>
-          <a:blip r:embed="rId2">
-            <a:extLst>
-              <a:ext uri="{28A0092B-C50C-407E-A947-70E740481C1C}">
-                <a14:useLocalDpi xmlns:a14="http://schemas.microsoft.com/office/drawing/2010/main" val="0"/>
-              </a:ext>
-            </a:extLst>
-          </a:blip>
-          <a:srcRect/>
-          <a:stretch>
-            <a:fillRect/>
-          </a:stretch>
-        </p:blipFill>
-        <p:spPr bwMode="auto">
-          <a:xfrm>
-            <a:off x="2997554" y="1271135"/>
-            <a:ext cx="5928732" cy="5457997"/>
-          </a:xfrm>
-          <a:prstGeom prst="rect">
-            <a:avLst/>
-          </a:prstGeom>
-          <a:noFill/>
-          <a:extLst>
-            <a:ext uri="{909E8E84-426E-40DD-AFC4-6F175D3DCCD1}">
-              <a14:hiddenFill xmlns:a14="http://schemas.microsoft.com/office/drawing/2010/main">
-                <a:solidFill>
-                  <a:srgbClr val="FFFFFF"/>
-                </a:solidFill>
-              </a14:hiddenFill>
-            </a:ext>
-          </a:extLst>
-        </p:spPr>
-      </p:pic>
-    </p:spTree>
-    <p:extLst>
-      <p:ext uri="{BB962C8B-B14F-4D97-AF65-F5344CB8AC3E}">
-        <p14:creationId xmlns:p14="http://schemas.microsoft.com/office/powerpoint/2010/main" val="3783540914"/>
-      </p:ext>
-    </p:extLst>
-  </p:cSld>
-  <p:clrMapOvr>
-    <a:masterClrMapping/>
-  </p:clrMapOvr>
-</p:sld>
-</file>
-
-<file path=ppt/slides/slide25.xml><?xml version="1.0" encoding="utf-8"?>
-<p:sld xmlns:a="http://schemas.openxmlformats.org/drawingml/2006/main" xmlns:r="http://schemas.openxmlformats.org/officeDocument/2006/relationships" xmlns:p="http://schemas.openxmlformats.org/presentationml/2006/main">
-  <p:cSld>
-    <p:spTree>
-      <p:nvGrpSpPr>
-        <p:cNvPr id="1" name=""/>
-        <p:cNvGrpSpPr/>
-        <p:nvPr/>
-      </p:nvGrpSpPr>
-      <p:grpSpPr>
-        <a:xfrm>
-          <a:off x="0" y="0"/>
-          <a:ext cx="0" cy="0"/>
-          <a:chOff x="0" y="0"/>
-          <a:chExt cx="0" cy="0"/>
-        </a:xfrm>
-      </p:grpSpPr>
-      <p:sp>
-        <p:nvSpPr>
-          <p:cNvPr id="2" name="Title 1">
-            <a:extLst>
-              <a:ext uri="{FF2B5EF4-FFF2-40B4-BE49-F238E27FC236}">
-                <a16:creationId xmlns:a16="http://schemas.microsoft.com/office/drawing/2014/main" id="{FD4CC6C4-B889-42E4-BA31-28441A814021}"/>
-              </a:ext>
-            </a:extLst>
-          </p:cNvPr>
-          <p:cNvSpPr>
-            <a:spLocks noGrp="1"/>
-          </p:cNvSpPr>
-          <p:nvPr>
-            <p:ph type="title"/>
-          </p:nvPr>
-        </p:nvSpPr>
-        <p:spPr/>
-        <p:txBody>
-          <a:bodyPr/>
-          <a:lstStyle/>
-          <a:p>
-            <a:r>
-              <a:rPr lang="en-CA" dirty="0"/>
-              <a:t>Usefulness of &lt;Style&gt; Tags</a:t>
-            </a:r>
-          </a:p>
-        </p:txBody>
-      </p:sp>
-      <p:sp>
-        <p:nvSpPr>
-          <p:cNvPr id="3" name="Content Placeholder 2">
-            <a:extLst>
-              <a:ext uri="{FF2B5EF4-FFF2-40B4-BE49-F238E27FC236}">
-                <a16:creationId xmlns:a16="http://schemas.microsoft.com/office/drawing/2014/main" id="{0874D5B9-99A5-404C-B507-E2DB9E45D7D9}"/>
-              </a:ext>
-            </a:extLst>
-          </p:cNvPr>
-          <p:cNvSpPr>
-            <a:spLocks noGrp="1"/>
-          </p:cNvSpPr>
-          <p:nvPr>
-            <p:ph idx="1"/>
-          </p:nvPr>
-        </p:nvSpPr>
-        <p:spPr/>
-        <p:txBody>
-          <a:bodyPr/>
-          <a:lstStyle/>
-          <a:p>
-            <a:r>
-              <a:rPr lang="en-CA" dirty="0"/>
-              <a:t>Usually, &lt;style&gt; tags are not always on HTML pages all the time</a:t>
-            </a:r>
-          </a:p>
-          <a:p>
-            <a:pPr lvl="1"/>
-            <a:r>
-              <a:rPr lang="en-CA" dirty="0"/>
-              <a:t>They’re there if you want to stylize on the fly</a:t>
-            </a:r>
-          </a:p>
-          <a:p>
-            <a:r>
-              <a:rPr lang="en-CA" dirty="0"/>
-              <a:t>Nowadays, web developers and web designers would use Cascading Style Sheets (or CSS for short) to be able to stylize their page</a:t>
-            </a:r>
-          </a:p>
-        </p:txBody>
-      </p:sp>
-    </p:spTree>
-    <p:extLst>
-      <p:ext uri="{BB962C8B-B14F-4D97-AF65-F5344CB8AC3E}">
-        <p14:creationId xmlns:p14="http://schemas.microsoft.com/office/powerpoint/2010/main" val="2757349750"/>
-      </p:ext>
-    </p:extLst>
-  </p:cSld>
-  <p:clrMapOvr>
-    <a:masterClrMapping/>
-  </p:clrMapOvr>
-</p:sld>
-</file>
-
-<file path=ppt/slides/slide26.xml><?xml version="1.0" encoding="utf-8"?>
-<p:sld xmlns:a="http://schemas.openxmlformats.org/drawingml/2006/main" xmlns:r="http://schemas.openxmlformats.org/officeDocument/2006/relationships" xmlns:p="http://schemas.openxmlformats.org/presentationml/2006/main">
-  <p:cSld>
-    <p:spTree>
-      <p:nvGrpSpPr>
-        <p:cNvPr id="1" name=""/>
-        <p:cNvGrpSpPr/>
-        <p:nvPr/>
-      </p:nvGrpSpPr>
-      <p:grpSpPr>
-        <a:xfrm>
-          <a:off x="0" y="0"/>
-          <a:ext cx="0" cy="0"/>
-          <a:chOff x="0" y="0"/>
-          <a:chExt cx="0" cy="0"/>
-        </a:xfrm>
-      </p:grpSpPr>
-      <p:sp>
-        <p:nvSpPr>
-          <p:cNvPr id="2" name="Title 1">
-            <a:extLst>
-              <a:ext uri="{FF2B5EF4-FFF2-40B4-BE49-F238E27FC236}">
-                <a16:creationId xmlns:a16="http://schemas.microsoft.com/office/drawing/2014/main" id="{FD4CC6C4-B889-42E4-BA31-28441A814021}"/>
-              </a:ext>
-            </a:extLst>
-          </p:cNvPr>
-          <p:cNvSpPr>
-            <a:spLocks noGrp="1"/>
-          </p:cNvSpPr>
-          <p:nvPr>
-            <p:ph type="title"/>
-          </p:nvPr>
-        </p:nvSpPr>
-        <p:spPr/>
-        <p:txBody>
-          <a:bodyPr/>
-          <a:lstStyle/>
-          <a:p>
-            <a:r>
-              <a:rPr lang="en-CA" dirty="0"/>
-              <a:t>CSS (1)</a:t>
-            </a:r>
-          </a:p>
-        </p:txBody>
-      </p:sp>
-      <p:sp>
-        <p:nvSpPr>
-          <p:cNvPr id="3" name="Content Placeholder 2">
-            <a:extLst>
-              <a:ext uri="{FF2B5EF4-FFF2-40B4-BE49-F238E27FC236}">
-                <a16:creationId xmlns:a16="http://schemas.microsoft.com/office/drawing/2014/main" id="{0874D5B9-99A5-404C-B507-E2DB9E45D7D9}"/>
-              </a:ext>
-            </a:extLst>
-          </p:cNvPr>
-          <p:cNvSpPr>
-            <a:spLocks noGrp="1"/>
-          </p:cNvSpPr>
-          <p:nvPr>
-            <p:ph idx="1"/>
-          </p:nvPr>
-        </p:nvSpPr>
-        <p:spPr/>
-        <p:txBody>
-          <a:bodyPr/>
-          <a:lstStyle/>
-          <a:p>
-            <a:r>
-              <a:rPr lang="en-CA" dirty="0"/>
-              <a:t>CSS is the &lt;style&gt; tag, where the styles and instructions are represented in a CSS file as opposed to putting them in the &lt;style&gt; tag of an HTML page</a:t>
-            </a:r>
-          </a:p>
-          <a:p>
-            <a:r>
-              <a:rPr lang="en-CA" dirty="0"/>
-              <a:t>There isn’t much  to say here other than that it allows for more flexibility</a:t>
-            </a:r>
-          </a:p>
-          <a:p>
-            <a:pPr lvl="1"/>
-            <a:r>
-              <a:rPr lang="en-CA" dirty="0"/>
-              <a:t>You don’t want to always type out the same &lt;style&gt; tag on all of your HTML pages of your website all the time</a:t>
-            </a:r>
-          </a:p>
-          <a:p>
-            <a:pPr lvl="1"/>
-            <a:r>
-              <a:rPr lang="en-CA" dirty="0"/>
-              <a:t>Not only would it be inefficient, you would be prone to making mistakes</a:t>
-            </a:r>
-          </a:p>
-          <a:p>
-            <a:pPr lvl="1"/>
-            <a:r>
-              <a:rPr lang="en-CA" dirty="0"/>
-              <a:t>All you need to do is link each HTML page to that particular CSS file</a:t>
-            </a:r>
-          </a:p>
-        </p:txBody>
-      </p:sp>
-    </p:spTree>
-    <p:extLst>
-      <p:ext uri="{BB962C8B-B14F-4D97-AF65-F5344CB8AC3E}">
-        <p14:creationId xmlns:p14="http://schemas.microsoft.com/office/powerpoint/2010/main" val="2491489194"/>
-      </p:ext>
-    </p:extLst>
-  </p:cSld>
-  <p:clrMapOvr>
-    <a:masterClrMapping/>
-  </p:clrMapOvr>
-</p:sld>
-</file>
-
-<file path=ppt/slides/slide27.xml><?xml version="1.0" encoding="utf-8"?>
-<p:sld xmlns:a="http://schemas.openxmlformats.org/drawingml/2006/main" xmlns:r="http://schemas.openxmlformats.org/officeDocument/2006/relationships" xmlns:p="http://schemas.openxmlformats.org/presentationml/2006/main">
-  <p:cSld>
-    <p:spTree>
-      <p:nvGrpSpPr>
-        <p:cNvPr id="1" name=""/>
-        <p:cNvGrpSpPr/>
-        <p:nvPr/>
-      </p:nvGrpSpPr>
-      <p:grpSpPr>
-        <a:xfrm>
-          <a:off x="0" y="0"/>
-          <a:ext cx="0" cy="0"/>
-          <a:chOff x="0" y="0"/>
-          <a:chExt cx="0" cy="0"/>
-        </a:xfrm>
-      </p:grpSpPr>
-      <p:sp>
-        <p:nvSpPr>
-          <p:cNvPr id="2" name="Title 1">
-            <a:extLst>
-              <a:ext uri="{FF2B5EF4-FFF2-40B4-BE49-F238E27FC236}">
-                <a16:creationId xmlns:a16="http://schemas.microsoft.com/office/drawing/2014/main" id="{FD4CC6C4-B889-42E4-BA31-28441A814021}"/>
-              </a:ext>
-            </a:extLst>
-          </p:cNvPr>
-          <p:cNvSpPr>
-            <a:spLocks noGrp="1"/>
-          </p:cNvSpPr>
-          <p:nvPr>
-            <p:ph type="title"/>
-          </p:nvPr>
-        </p:nvSpPr>
-        <p:spPr/>
-        <p:txBody>
-          <a:bodyPr/>
-          <a:lstStyle/>
-          <a:p>
-            <a:r>
-              <a:rPr lang="en-CA" dirty="0"/>
-              <a:t>CSS (2)</a:t>
-            </a:r>
-          </a:p>
-        </p:txBody>
-      </p:sp>
-      <p:sp>
-        <p:nvSpPr>
-          <p:cNvPr id="3" name="Content Placeholder 2">
-            <a:extLst>
-              <a:ext uri="{FF2B5EF4-FFF2-40B4-BE49-F238E27FC236}">
-                <a16:creationId xmlns:a16="http://schemas.microsoft.com/office/drawing/2014/main" id="{0874D5B9-99A5-404C-B507-E2DB9E45D7D9}"/>
-              </a:ext>
-            </a:extLst>
-          </p:cNvPr>
-          <p:cNvSpPr>
-            <a:spLocks noGrp="1"/>
-          </p:cNvSpPr>
-          <p:nvPr>
-            <p:ph idx="1"/>
-          </p:nvPr>
-        </p:nvSpPr>
-        <p:spPr/>
-        <p:txBody>
-          <a:bodyPr/>
-          <a:lstStyle/>
-          <a:p>
-            <a:r>
-              <a:rPr lang="en-CA" dirty="0"/>
-              <a:t>To link a CSS file on your HTML page, all you need is to put the following link in your &lt;head&gt; tag of the HTML page:</a:t>
-            </a:r>
-          </a:p>
-          <a:p>
-            <a:pPr marL="0" indent="0" algn="ctr">
-              <a:buNone/>
-            </a:pPr>
-            <a:r>
-              <a:rPr lang="en-CA" i="1" dirty="0"/>
-              <a:t>&lt;link </a:t>
-            </a:r>
-            <a:r>
-              <a:rPr lang="en-CA" i="1" dirty="0" err="1"/>
-              <a:t>href</a:t>
-            </a:r>
-            <a:r>
-              <a:rPr lang="en-CA" i="1" dirty="0"/>
-              <a:t>=“[area of where your </a:t>
-            </a:r>
-            <a:r>
-              <a:rPr lang="en-CA" i="1" dirty="0" err="1"/>
-              <a:t>css</a:t>
-            </a:r>
-            <a:r>
-              <a:rPr lang="en-CA" i="1" dirty="0"/>
-              <a:t> file is located]” </a:t>
-            </a:r>
-            <a:r>
-              <a:rPr lang="en-CA" i="1" dirty="0" err="1"/>
-              <a:t>rel</a:t>
-            </a:r>
-            <a:r>
-              <a:rPr lang="en-CA" i="1" dirty="0"/>
-              <a:t>=“stylesheet” type=“text/</a:t>
-            </a:r>
-            <a:r>
-              <a:rPr lang="en-CA" i="1" dirty="0" err="1"/>
-              <a:t>css</a:t>
-            </a:r>
-            <a:r>
-              <a:rPr lang="en-CA" i="1" dirty="0"/>
-              <a:t>”/&gt;</a:t>
-            </a:r>
-          </a:p>
-        </p:txBody>
-      </p:sp>
-    </p:spTree>
-    <p:extLst>
-      <p:ext uri="{BB962C8B-B14F-4D97-AF65-F5344CB8AC3E}">
-        <p14:creationId xmlns:p14="http://schemas.microsoft.com/office/powerpoint/2010/main" val="1201298774"/>
-      </p:ext>
-    </p:extLst>
-  </p:cSld>
-  <p:clrMapOvr>
-    <a:masterClrMapping/>
-  </p:clrMapOvr>
-</p:sld>
-</file>
-
-<file path=ppt/slides/slide28.xml><?xml version="1.0" encoding="utf-8"?>
-<p:sld xmlns:a="http://schemas.openxmlformats.org/drawingml/2006/main" xmlns:r="http://schemas.openxmlformats.org/officeDocument/2006/relationships" xmlns:p="http://schemas.openxmlformats.org/presentationml/2006/main">
-  <p:cSld>
-    <p:spTree>
-      <p:nvGrpSpPr>
-        <p:cNvPr id="1" name=""/>
-        <p:cNvGrpSpPr/>
-        <p:nvPr/>
-      </p:nvGrpSpPr>
-      <p:grpSpPr>
-        <a:xfrm>
-          <a:off x="0" y="0"/>
-          <a:ext cx="0" cy="0"/>
-          <a:chOff x="0" y="0"/>
-          <a:chExt cx="0" cy="0"/>
-        </a:xfrm>
-      </p:grpSpPr>
-      <p:sp>
-        <p:nvSpPr>
-          <p:cNvPr id="2" name="Title 1">
-            <a:extLst>
-              <a:ext uri="{FF2B5EF4-FFF2-40B4-BE49-F238E27FC236}">
-                <a16:creationId xmlns:a16="http://schemas.microsoft.com/office/drawing/2014/main" id="{FD4CC6C4-B889-42E4-BA31-28441A814021}"/>
-              </a:ext>
-            </a:extLst>
-          </p:cNvPr>
-          <p:cNvSpPr>
-            <a:spLocks noGrp="1"/>
-          </p:cNvSpPr>
-          <p:nvPr>
-            <p:ph type="title"/>
-          </p:nvPr>
-        </p:nvSpPr>
-        <p:spPr/>
-        <p:txBody>
-          <a:bodyPr/>
-          <a:lstStyle/>
-          <a:p>
-            <a:r>
-              <a:rPr lang="en-CA" dirty="0"/>
-              <a:t>CSS (3)</a:t>
-            </a:r>
-          </a:p>
-        </p:txBody>
-      </p:sp>
-      <p:sp>
-        <p:nvSpPr>
-          <p:cNvPr id="3" name="Content Placeholder 2">
-            <a:extLst>
-              <a:ext uri="{FF2B5EF4-FFF2-40B4-BE49-F238E27FC236}">
-                <a16:creationId xmlns:a16="http://schemas.microsoft.com/office/drawing/2014/main" id="{0874D5B9-99A5-404C-B507-E2DB9E45D7D9}"/>
-              </a:ext>
-            </a:extLst>
-          </p:cNvPr>
-          <p:cNvSpPr>
-            <a:spLocks noGrp="1"/>
-          </p:cNvSpPr>
-          <p:nvPr>
-            <p:ph idx="1"/>
-          </p:nvPr>
-        </p:nvSpPr>
-        <p:spPr/>
-        <p:txBody>
-          <a:bodyPr/>
-          <a:lstStyle/>
-          <a:p>
-            <a:r>
-              <a:rPr lang="en-CA" dirty="0"/>
-              <a:t>One thing to note about HTML is that everything comes in blocks (or boxes, if you want to be more direct about it)</a:t>
-            </a:r>
-          </a:p>
-          <a:p>
-            <a:r>
-              <a:rPr lang="en-CA" dirty="0"/>
-              <a:t>What do I mean by this?</a:t>
-            </a:r>
-          </a:p>
-        </p:txBody>
-      </p:sp>
-    </p:spTree>
-    <p:extLst>
-      <p:ext uri="{BB962C8B-B14F-4D97-AF65-F5344CB8AC3E}">
-        <p14:creationId xmlns:p14="http://schemas.microsoft.com/office/powerpoint/2010/main" val="2763325561"/>
-      </p:ext>
-    </p:extLst>
-  </p:cSld>
-  <p:clrMapOvr>
-    <a:masterClrMapping/>
-  </p:clrMapOvr>
-</p:sld>
-</file>
-
-<file path=ppt/slides/slide29.xml><?xml version="1.0" encoding="utf-8"?>
-<p:sld xmlns:a="http://schemas.openxmlformats.org/drawingml/2006/main" xmlns:r="http://schemas.openxmlformats.org/officeDocument/2006/relationships" xmlns:p="http://schemas.openxmlformats.org/presentationml/2006/main">
-  <p:cSld>
-    <p:spTree>
-      <p:nvGrpSpPr>
-        <p:cNvPr id="1" name=""/>
-        <p:cNvGrpSpPr/>
-        <p:nvPr/>
-      </p:nvGrpSpPr>
-      <p:grpSpPr>
-        <a:xfrm>
-          <a:off x="0" y="0"/>
-          <a:ext cx="0" cy="0"/>
-          <a:chOff x="0" y="0"/>
-          <a:chExt cx="0" cy="0"/>
-        </a:xfrm>
-      </p:grpSpPr>
-      <p:sp>
-        <p:nvSpPr>
-          <p:cNvPr id="2" name="Title 1">
-            <a:extLst>
-              <a:ext uri="{FF2B5EF4-FFF2-40B4-BE49-F238E27FC236}">
-                <a16:creationId xmlns:a16="http://schemas.microsoft.com/office/drawing/2014/main" id="{FD4CC6C4-B889-42E4-BA31-28441A814021}"/>
-              </a:ext>
-            </a:extLst>
-          </p:cNvPr>
-          <p:cNvSpPr>
-            <a:spLocks noGrp="1"/>
-          </p:cNvSpPr>
-          <p:nvPr>
-            <p:ph type="title"/>
-          </p:nvPr>
-        </p:nvSpPr>
-        <p:spPr/>
-        <p:txBody>
-          <a:bodyPr/>
-          <a:lstStyle/>
-          <a:p>
-            <a:r>
-              <a:rPr lang="en-CA" dirty="0"/>
-              <a:t>Organizing Content with Flexbox (1)</a:t>
-            </a:r>
-          </a:p>
-        </p:txBody>
-      </p:sp>
-      <p:sp>
-        <p:nvSpPr>
-          <p:cNvPr id="3" name="Content Placeholder 2">
-            <a:extLst>
-              <a:ext uri="{FF2B5EF4-FFF2-40B4-BE49-F238E27FC236}">
-                <a16:creationId xmlns:a16="http://schemas.microsoft.com/office/drawing/2014/main" id="{0874D5B9-99A5-404C-B507-E2DB9E45D7D9}"/>
-              </a:ext>
-            </a:extLst>
-          </p:cNvPr>
-          <p:cNvSpPr>
-            <a:spLocks noGrp="1"/>
-          </p:cNvSpPr>
-          <p:nvPr>
-            <p:ph idx="1"/>
-          </p:nvPr>
-        </p:nvSpPr>
-        <p:spPr/>
-        <p:txBody>
-          <a:bodyPr/>
-          <a:lstStyle/>
-          <a:p>
-            <a:r>
-              <a:rPr lang="en-CA" dirty="0" err="1"/>
-              <a:t>asdf</a:t>
-            </a:r>
-            <a:endParaRPr lang="en-CA" dirty="0"/>
-          </a:p>
-        </p:txBody>
-      </p:sp>
-    </p:spTree>
-    <p:extLst>
-      <p:ext uri="{BB962C8B-B14F-4D97-AF65-F5344CB8AC3E}">
-        <p14:creationId xmlns:p14="http://schemas.microsoft.com/office/powerpoint/2010/main" val="3120293644"/>
-      </p:ext>
-    </p:extLst>
-  </p:cSld>
-  <p:clrMapOvr>
-    <a:masterClrMapping/>
-  </p:clrMapOvr>
-</p:sld>
-</file>
-
-<file path=ppt/slides/slide3.xml><?xml version="1.0" encoding="utf-8"?>
-<p:sld xmlns:a="http://schemas.openxmlformats.org/drawingml/2006/main" xmlns:r="http://schemas.openxmlformats.org/officeDocument/2006/relationships" xmlns:p="http://schemas.openxmlformats.org/presentationml/2006/main">
-  <p:cSld>
-    <p:spTree>
-      <p:nvGrpSpPr>
-        <p:cNvPr id="1" name=""/>
-        <p:cNvGrpSpPr/>
-        <p:nvPr/>
-      </p:nvGrpSpPr>
-      <p:grpSpPr>
-        <a:xfrm>
-          <a:off x="0" y="0"/>
-          <a:ext cx="0" cy="0"/>
-          <a:chOff x="0" y="0"/>
-          <a:chExt cx="0" cy="0"/>
-        </a:xfrm>
-      </p:grpSpPr>
-      <p:sp>
-        <p:nvSpPr>
-          <p:cNvPr id="2" name="Title 1">
-            <a:extLst>
-              <a:ext uri="{FF2B5EF4-FFF2-40B4-BE49-F238E27FC236}">
-                <a16:creationId xmlns:a16="http://schemas.microsoft.com/office/drawing/2014/main" id="{FD4CC6C4-B889-42E4-BA31-28441A814021}"/>
-              </a:ext>
-            </a:extLst>
-          </p:cNvPr>
-          <p:cNvSpPr>
-            <a:spLocks noGrp="1"/>
-          </p:cNvSpPr>
-          <p:nvPr>
-            <p:ph type="title"/>
-          </p:nvPr>
-        </p:nvSpPr>
-        <p:spPr/>
-        <p:txBody>
-          <a:bodyPr/>
-          <a:lstStyle/>
-          <a:p>
-            <a:r>
-              <a:rPr lang="en-CA" dirty="0"/>
-              <a:t>Lab 1</a:t>
-            </a:r>
-          </a:p>
-        </p:txBody>
-      </p:sp>
-      <p:sp>
-        <p:nvSpPr>
-          <p:cNvPr id="3" name="Content Placeholder 2">
-            <a:extLst>
-              <a:ext uri="{FF2B5EF4-FFF2-40B4-BE49-F238E27FC236}">
-                <a16:creationId xmlns:a16="http://schemas.microsoft.com/office/drawing/2014/main" id="{0874D5B9-99A5-404C-B507-E2DB9E45D7D9}"/>
-              </a:ext>
-            </a:extLst>
-          </p:cNvPr>
-          <p:cNvSpPr>
-            <a:spLocks noGrp="1"/>
-          </p:cNvSpPr>
-          <p:nvPr>
-            <p:ph idx="1"/>
-          </p:nvPr>
-        </p:nvSpPr>
-        <p:spPr/>
-        <p:txBody>
-          <a:bodyPr/>
-          <a:lstStyle/>
-          <a:p>
-            <a:r>
-              <a:rPr lang="en-CA" dirty="0"/>
-              <a:t>How did lab 1 go?</a:t>
-            </a:r>
-          </a:p>
-          <a:p>
-            <a:r>
-              <a:rPr lang="en-CA" dirty="0"/>
-              <a:t>Were there any troubling spots? Hope not!</a:t>
-            </a:r>
-          </a:p>
-          <a:p>
-            <a:r>
-              <a:rPr lang="en-CA" dirty="0"/>
-              <a:t>For those that handed it in, give yourselves a pat on your back.</a:t>
-            </a:r>
-          </a:p>
-          <a:p>
-            <a:r>
-              <a:rPr lang="en-CA" dirty="0"/>
-              <a:t>Lab 1 was due last night at 11:59pm. If you haven’t done lab 1 yet, I will extend it until Sunday night, 11:59pm</a:t>
-            </a:r>
-          </a:p>
-          <a:p>
-            <a:pPr lvl="1"/>
-            <a:r>
-              <a:rPr lang="en-CA" dirty="0"/>
-              <a:t>Makes it easier, right?</a:t>
-            </a:r>
-          </a:p>
-          <a:p>
-            <a:pPr lvl="1"/>
-            <a:r>
-              <a:rPr lang="en-CA" dirty="0"/>
-              <a:t>It will be only due tomorrow night, however! No extensions!</a:t>
-            </a:r>
-          </a:p>
-          <a:p>
-            <a:pPr lvl="1"/>
-            <a:r>
-              <a:rPr lang="en-CA" dirty="0"/>
-              <a:t>All labs will be due on Sunday night, 11:59pm. This is to make it easier for those who may have tests or assignments due at school during the week</a:t>
-            </a:r>
-          </a:p>
-        </p:txBody>
-      </p:sp>
-    </p:spTree>
-    <p:extLst>
-      <p:ext uri="{BB962C8B-B14F-4D97-AF65-F5344CB8AC3E}">
-        <p14:creationId xmlns:p14="http://schemas.microsoft.com/office/powerpoint/2010/main" val="3364035182"/>
-      </p:ext>
-    </p:extLst>
-  </p:cSld>
-  <p:clrMapOvr>
-    <a:masterClrMapping/>
-  </p:clrMapOvr>
-</p:sld>
-</file>
-
-<file path=ppt/slides/slide30.xml><?xml version="1.0" encoding="utf-8"?>
-<p:sld xmlns:a="http://schemas.openxmlformats.org/drawingml/2006/main" xmlns:r="http://schemas.openxmlformats.org/officeDocument/2006/relationships" xmlns:p="http://schemas.openxmlformats.org/presentationml/2006/main">
-  <p:cSld>
-    <p:spTree>
-      <p:nvGrpSpPr>
-        <p:cNvPr id="1" name=""/>
-        <p:cNvGrpSpPr/>
-        <p:nvPr/>
-      </p:nvGrpSpPr>
-      <p:grpSpPr>
-        <a:xfrm>
-          <a:off x="0" y="0"/>
-          <a:ext cx="0" cy="0"/>
-          <a:chOff x="0" y="0"/>
-          <a:chExt cx="0" cy="0"/>
-        </a:xfrm>
-      </p:grpSpPr>
-      <p:sp>
-        <p:nvSpPr>
-          <p:cNvPr id="2" name="Title 1">
-            <a:extLst>
-              <a:ext uri="{FF2B5EF4-FFF2-40B4-BE49-F238E27FC236}">
-                <a16:creationId xmlns:a16="http://schemas.microsoft.com/office/drawing/2014/main" id="{FD4CC6C4-B889-42E4-BA31-28441A814021}"/>
-              </a:ext>
-            </a:extLst>
-          </p:cNvPr>
-          <p:cNvSpPr>
-            <a:spLocks noGrp="1"/>
-          </p:cNvSpPr>
-          <p:nvPr>
-            <p:ph type="title"/>
-          </p:nvPr>
-        </p:nvSpPr>
-        <p:spPr/>
-        <p:txBody>
-          <a:bodyPr/>
-          <a:lstStyle/>
-          <a:p>
-            <a:r>
-              <a:rPr lang="en-CA" dirty="0"/>
-              <a:t>Break #2</a:t>
-            </a:r>
-          </a:p>
-        </p:txBody>
-      </p:sp>
-      <p:sp>
-        <p:nvSpPr>
-          <p:cNvPr id="4" name="Content Placeholder 3">
-            <a:extLst>
-              <a:ext uri="{FF2B5EF4-FFF2-40B4-BE49-F238E27FC236}">
-                <a16:creationId xmlns:a16="http://schemas.microsoft.com/office/drawing/2014/main" id="{A14C1509-144C-4E9E-BC44-38AABB128F97}"/>
-              </a:ext>
-            </a:extLst>
-          </p:cNvPr>
-          <p:cNvSpPr>
-            <a:spLocks noGrp="1"/>
-          </p:cNvSpPr>
-          <p:nvPr>
-            <p:ph idx="1"/>
-          </p:nvPr>
-        </p:nvSpPr>
-        <p:spPr/>
-        <p:txBody>
-          <a:bodyPr/>
-          <a:lstStyle/>
-          <a:p>
-            <a:endParaRPr lang="en-CA" dirty="0"/>
-          </a:p>
-        </p:txBody>
-      </p:sp>
-      <p:pic>
-        <p:nvPicPr>
-          <p:cNvPr id="5122" name="Picture 2" descr="Image result for break memes">
-            <a:extLst>
-              <a:ext uri="{FF2B5EF4-FFF2-40B4-BE49-F238E27FC236}">
-                <a16:creationId xmlns:a16="http://schemas.microsoft.com/office/drawing/2014/main" id="{7DF6A138-60B8-4124-AFBA-347F7F824ADF}"/>
-              </a:ext>
-            </a:extLst>
-          </p:cNvPr>
-          <p:cNvPicPr>
-            <a:picLocks noChangeAspect="1" noChangeArrowheads="1"/>
-          </p:cNvPicPr>
-          <p:nvPr/>
-        </p:nvPicPr>
-        <p:blipFill rotWithShape="1">
-          <a:blip r:embed="rId2">
-            <a:extLst>
-              <a:ext uri="{28A0092B-C50C-407E-A947-70E740481C1C}">
-                <a14:useLocalDpi xmlns:a14="http://schemas.microsoft.com/office/drawing/2010/main" val="0"/>
-              </a:ext>
-            </a:extLst>
-          </a:blip>
-          <a:srcRect t="-1" b="-1"/>
-          <a:stretch/>
-        </p:blipFill>
-        <p:spPr bwMode="auto">
-          <a:xfrm>
-            <a:off x="4186238" y="0"/>
-            <a:ext cx="3819525" cy="6858000"/>
+            <a:off x="3656559" y="1905227"/>
+            <a:ext cx="4876800" cy="3686175"/>
           </a:xfrm>
           <a:prstGeom prst="rect">
             <a:avLst/>
@@ -6519,7 +3625,7 @@
 </p:sld>
 </file>
 
-<file path=ppt/slides/slide31.xml><?xml version="1.0" encoding="utf-8"?>
+<file path=ppt/slides/slide12.xml><?xml version="1.0" encoding="utf-8"?>
 <p:sld xmlns:a="http://schemas.openxmlformats.org/drawingml/2006/main" xmlns:r="http://schemas.openxmlformats.org/officeDocument/2006/relationships" xmlns:p="http://schemas.openxmlformats.org/presentationml/2006/main">
   <p:cSld>
     <p:spTree>
@@ -6559,7 +3665,323 @@
           <a:p>
             <a:r>
               <a:rPr lang="en-CA" dirty="0"/>
-              <a:t>Let’s put all of this in action!</a:t>
+              <a:t>Break #2</a:t>
+            </a:r>
+          </a:p>
+        </p:txBody>
+      </p:sp>
+      <p:sp>
+        <p:nvSpPr>
+          <p:cNvPr id="4" name="Content Placeholder 3">
+            <a:extLst>
+              <a:ext uri="{FF2B5EF4-FFF2-40B4-BE49-F238E27FC236}">
+                <a16:creationId xmlns:a16="http://schemas.microsoft.com/office/drawing/2014/main" id="{A14C1509-144C-4E9E-BC44-38AABB128F97}"/>
+              </a:ext>
+            </a:extLst>
+          </p:cNvPr>
+          <p:cNvSpPr>
+            <a:spLocks noGrp="1"/>
+          </p:cNvSpPr>
+          <p:nvPr>
+            <p:ph idx="1"/>
+          </p:nvPr>
+        </p:nvSpPr>
+        <p:spPr/>
+        <p:txBody>
+          <a:bodyPr/>
+          <a:lstStyle/>
+          <a:p>
+            <a:endParaRPr lang="en-CA" dirty="0"/>
+          </a:p>
+        </p:txBody>
+      </p:sp>
+      <p:pic>
+        <p:nvPicPr>
+          <p:cNvPr id="4098" name="Picture 2" descr="Image result for Take a break memes">
+            <a:extLst>
+              <a:ext uri="{FF2B5EF4-FFF2-40B4-BE49-F238E27FC236}">
+                <a16:creationId xmlns:a16="http://schemas.microsoft.com/office/drawing/2014/main" id="{81AFB48A-B2F7-43F9-865D-4A2540FFF7EA}"/>
+              </a:ext>
+            </a:extLst>
+          </p:cNvPr>
+          <p:cNvPicPr>
+            <a:picLocks noChangeAspect="1" noChangeArrowheads="1"/>
+          </p:cNvPicPr>
+          <p:nvPr/>
+        </p:nvPicPr>
+        <p:blipFill>
+          <a:blip r:embed="rId2">
+            <a:extLst>
+              <a:ext uri="{28A0092B-C50C-407E-A947-70E740481C1C}">
+                <a14:useLocalDpi xmlns:a14="http://schemas.microsoft.com/office/drawing/2010/main" val="0"/>
+              </a:ext>
+            </a:extLst>
+          </a:blip>
+          <a:srcRect/>
+          <a:stretch>
+            <a:fillRect/>
+          </a:stretch>
+        </p:blipFill>
+        <p:spPr bwMode="auto">
+          <a:xfrm>
+            <a:off x="4189959" y="1792936"/>
+            <a:ext cx="3810000" cy="3810000"/>
+          </a:xfrm>
+          <a:prstGeom prst="rect">
+            <a:avLst/>
+          </a:prstGeom>
+          <a:noFill/>
+          <a:extLst>
+            <a:ext uri="{909E8E84-426E-40DD-AFC4-6F175D3DCCD1}">
+              <a14:hiddenFill xmlns:a14="http://schemas.microsoft.com/office/drawing/2010/main">
+                <a:solidFill>
+                  <a:srgbClr val="FFFFFF"/>
+                </a:solidFill>
+              </a14:hiddenFill>
+            </a:ext>
+          </a:extLst>
+        </p:spPr>
+      </p:pic>
+    </p:spTree>
+    <p:extLst>
+      <p:ext uri="{BB962C8B-B14F-4D97-AF65-F5344CB8AC3E}">
+        <p14:creationId xmlns:p14="http://schemas.microsoft.com/office/powerpoint/2010/main" val="3258687731"/>
+      </p:ext>
+    </p:extLst>
+  </p:cSld>
+  <p:clrMapOvr>
+    <a:masterClrMapping/>
+  </p:clrMapOvr>
+</p:sld>
+</file>
+
+<file path=ppt/slides/slide2.xml><?xml version="1.0" encoding="utf-8"?>
+<p:sld xmlns:a="http://schemas.openxmlformats.org/drawingml/2006/main" xmlns:r="http://schemas.openxmlformats.org/officeDocument/2006/relationships" xmlns:p="http://schemas.openxmlformats.org/presentationml/2006/main">
+  <p:cSld>
+    <p:spTree>
+      <p:nvGrpSpPr>
+        <p:cNvPr id="1" name=""/>
+        <p:cNvGrpSpPr/>
+        <p:nvPr/>
+      </p:nvGrpSpPr>
+      <p:grpSpPr>
+        <a:xfrm>
+          <a:off x="0" y="0"/>
+          <a:ext cx="0" cy="0"/>
+          <a:chOff x="0" y="0"/>
+          <a:chExt cx="0" cy="0"/>
+        </a:xfrm>
+      </p:grpSpPr>
+      <p:sp>
+        <p:nvSpPr>
+          <p:cNvPr id="2" name="Title 1">
+            <a:extLst>
+              <a:ext uri="{FF2B5EF4-FFF2-40B4-BE49-F238E27FC236}">
+                <a16:creationId xmlns:a16="http://schemas.microsoft.com/office/drawing/2014/main" id="{F3D7348F-85A1-4EC9-B8BF-441BD46994E0}"/>
+              </a:ext>
+            </a:extLst>
+          </p:cNvPr>
+          <p:cNvSpPr>
+            <a:spLocks noGrp="1"/>
+          </p:cNvSpPr>
+          <p:nvPr>
+            <p:ph type="title"/>
+          </p:nvPr>
+        </p:nvSpPr>
+        <p:spPr/>
+        <p:txBody>
+          <a:bodyPr/>
+          <a:lstStyle/>
+          <a:p>
+            <a:r>
+              <a:rPr lang="en-CA" dirty="0"/>
+              <a:t>Welcome Back!</a:t>
+            </a:r>
+          </a:p>
+        </p:txBody>
+      </p:sp>
+      <p:sp>
+        <p:nvSpPr>
+          <p:cNvPr id="3" name="Content Placeholder 2">
+            <a:extLst>
+              <a:ext uri="{FF2B5EF4-FFF2-40B4-BE49-F238E27FC236}">
+                <a16:creationId xmlns:a16="http://schemas.microsoft.com/office/drawing/2014/main" id="{B25ED2B4-C36E-4DF1-AC2B-8A01F793B943}"/>
+              </a:ext>
+            </a:extLst>
+          </p:cNvPr>
+          <p:cNvSpPr>
+            <a:spLocks noGrp="1"/>
+          </p:cNvSpPr>
+          <p:nvPr>
+            <p:ph idx="1"/>
+          </p:nvPr>
+        </p:nvSpPr>
+        <p:spPr>
+          <a:xfrm>
+            <a:off x="1202919" y="1859280"/>
+            <a:ext cx="9784080" cy="4206240"/>
+          </a:xfrm>
+        </p:spPr>
+        <p:txBody>
+          <a:bodyPr/>
+          <a:lstStyle/>
+          <a:p>
+            <a:r>
+              <a:rPr lang="en-CA" dirty="0"/>
+              <a:t>Hope that your week went well!</a:t>
+            </a:r>
+          </a:p>
+          <a:p>
+            <a:endParaRPr lang="en-CA" dirty="0"/>
+          </a:p>
+        </p:txBody>
+      </p:sp>
+      <p:sp>
+        <p:nvSpPr>
+          <p:cNvPr id="4" name="AutoShape 2" descr="Image result for Enjoy meme">
+            <a:extLst>
+              <a:ext uri="{FF2B5EF4-FFF2-40B4-BE49-F238E27FC236}">
+                <a16:creationId xmlns:a16="http://schemas.microsoft.com/office/drawing/2014/main" id="{3DBA598A-F250-4F94-96D0-090C417B6C56}"/>
+              </a:ext>
+            </a:extLst>
+          </p:cNvPr>
+          <p:cNvSpPr>
+            <a:spLocks noChangeAspect="1" noChangeArrowheads="1"/>
+          </p:cNvSpPr>
+          <p:nvPr/>
+        </p:nvSpPr>
+        <p:spPr bwMode="auto">
+          <a:xfrm>
+            <a:off x="5943600" y="3276600"/>
+            <a:ext cx="304800" cy="304800"/>
+          </a:xfrm>
+          <a:prstGeom prst="rect">
+            <a:avLst/>
+          </a:prstGeom>
+          <a:noFill/>
+          <a:extLst>
+            <a:ext uri="{909E8E84-426E-40DD-AFC4-6F175D3DCCD1}">
+              <a14:hiddenFill xmlns:a14="http://schemas.microsoft.com/office/drawing/2010/main">
+                <a:solidFill>
+                  <a:srgbClr val="FFFFFF"/>
+                </a:solidFill>
+              </a14:hiddenFill>
+            </a:ext>
+          </a:extLst>
+        </p:spPr>
+        <p:txBody>
+          <a:bodyPr vert="horz" wrap="square" lIns="91440" tIns="45720" rIns="91440" bIns="45720" numCol="1" anchor="t" anchorCtr="0" compatLnSpc="1">
+            <a:prstTxWarp prst="textNoShape">
+              <a:avLst/>
+            </a:prstTxWarp>
+          </a:bodyPr>
+          <a:lstStyle/>
+          <a:p>
+            <a:endParaRPr lang="en-CA"/>
+          </a:p>
+        </p:txBody>
+      </p:sp>
+      <p:pic>
+        <p:nvPicPr>
+          <p:cNvPr id="5" name="Picture 2" descr="Image result for How was your week memes">
+            <a:extLst>
+              <a:ext uri="{FF2B5EF4-FFF2-40B4-BE49-F238E27FC236}">
+                <a16:creationId xmlns:a16="http://schemas.microsoft.com/office/drawing/2014/main" id="{8D7CB6D5-AEAD-49FE-A6F5-9E6DEBB2F371}"/>
+              </a:ext>
+            </a:extLst>
+          </p:cNvPr>
+          <p:cNvPicPr>
+            <a:picLocks noChangeAspect="1" noChangeArrowheads="1"/>
+          </p:cNvPicPr>
+          <p:nvPr/>
+        </p:nvPicPr>
+        <p:blipFill>
+          <a:blip r:embed="rId2">
+            <a:extLst>
+              <a:ext uri="{28A0092B-C50C-407E-A947-70E740481C1C}">
+                <a14:useLocalDpi xmlns:a14="http://schemas.microsoft.com/office/drawing/2010/main" val="0"/>
+              </a:ext>
+            </a:extLst>
+          </a:blip>
+          <a:srcRect/>
+          <a:stretch>
+            <a:fillRect/>
+          </a:stretch>
+        </p:blipFill>
+        <p:spPr bwMode="auto">
+          <a:xfrm>
+            <a:off x="3823655" y="2367584"/>
+            <a:ext cx="4239890" cy="4206240"/>
+          </a:xfrm>
+          <a:prstGeom prst="rect">
+            <a:avLst/>
+          </a:prstGeom>
+          <a:noFill/>
+          <a:extLst>
+            <a:ext uri="{909E8E84-426E-40DD-AFC4-6F175D3DCCD1}">
+              <a14:hiddenFill xmlns:a14="http://schemas.microsoft.com/office/drawing/2010/main">
+                <a:solidFill>
+                  <a:srgbClr val="FFFFFF"/>
+                </a:solidFill>
+              </a14:hiddenFill>
+            </a:ext>
+          </a:extLst>
+        </p:spPr>
+      </p:pic>
+    </p:spTree>
+    <p:extLst>
+      <p:ext uri="{BB962C8B-B14F-4D97-AF65-F5344CB8AC3E}">
+        <p14:creationId xmlns:p14="http://schemas.microsoft.com/office/powerpoint/2010/main" val="637461931"/>
+      </p:ext>
+    </p:extLst>
+  </p:cSld>
+  <p:clrMapOvr>
+    <a:masterClrMapping/>
+  </p:clrMapOvr>
+</p:sld>
+</file>
+
+<file path=ppt/slides/slide3.xml><?xml version="1.0" encoding="utf-8"?>
+<p:sld xmlns:a="http://schemas.openxmlformats.org/drawingml/2006/main" xmlns:r="http://schemas.openxmlformats.org/officeDocument/2006/relationships" xmlns:p="http://schemas.openxmlformats.org/presentationml/2006/main">
+  <p:cSld>
+    <p:spTree>
+      <p:nvGrpSpPr>
+        <p:cNvPr id="1" name=""/>
+        <p:cNvGrpSpPr/>
+        <p:nvPr/>
+      </p:nvGrpSpPr>
+      <p:grpSpPr>
+        <a:xfrm>
+          <a:off x="0" y="0"/>
+          <a:ext cx="0" cy="0"/>
+          <a:chOff x="0" y="0"/>
+          <a:chExt cx="0" cy="0"/>
+        </a:xfrm>
+      </p:grpSpPr>
+      <p:sp>
+        <p:nvSpPr>
+          <p:cNvPr id="2" name="Title 1">
+            <a:extLst>
+              <a:ext uri="{FF2B5EF4-FFF2-40B4-BE49-F238E27FC236}">
+                <a16:creationId xmlns:a16="http://schemas.microsoft.com/office/drawing/2014/main" id="{FD4CC6C4-B889-42E4-BA31-28441A814021}"/>
+              </a:ext>
+            </a:extLst>
+          </p:cNvPr>
+          <p:cNvSpPr>
+            <a:spLocks noGrp="1"/>
+          </p:cNvSpPr>
+          <p:nvPr>
+            <p:ph type="title"/>
+          </p:nvPr>
+        </p:nvSpPr>
+        <p:spPr/>
+        <p:txBody>
+          <a:bodyPr/>
+          <a:lstStyle/>
+          <a:p>
+            <a:r>
+              <a:rPr lang="en-CA" dirty="0"/>
+              <a:t>Project #1</a:t>
             </a:r>
           </a:p>
         </p:txBody>
@@ -6582,18 +4004,57 @@
         </p:nvSpPr>
         <p:spPr/>
         <p:txBody>
-          <a:bodyPr>
-            <a:normAutofit/>
-          </a:bodyPr>
+          <a:bodyPr/>
           <a:lstStyle/>
           <a:p>
             <a:r>
               <a:rPr lang="en-CA" dirty="0"/>
-              <a:t>Pull up your favourite editor and let’s start coding!</a:t>
+              <a:t>Project #1 will be posted tonight!</a:t>
+            </a:r>
+          </a:p>
+          <a:p>
+            <a:r>
+              <a:rPr lang="en-CA" dirty="0"/>
+              <a:t>It’s about frontend development</a:t>
             </a:r>
           </a:p>
           <a:p>
             <a:pPr lvl="1"/>
+            <a:r>
+              <a:rPr lang="en-CA" dirty="0"/>
+              <a:t>from styling something to using JavaScript on the browser</a:t>
+            </a:r>
+          </a:p>
+          <a:p>
+            <a:r>
+              <a:rPr lang="en-CA" dirty="0"/>
+              <a:t>It’s putting your skills to the test!</a:t>
+            </a:r>
+          </a:p>
+          <a:p>
+            <a:r>
+              <a:rPr lang="en-CA" dirty="0"/>
+              <a:t>It won’t be due until April 30</a:t>
+            </a:r>
+            <a:r>
+              <a:rPr lang="en-CA" baseline="30000" dirty="0"/>
+              <a:t>th</a:t>
+            </a:r>
+            <a:r>
+              <a:rPr lang="en-CA" dirty="0"/>
+              <a:t>…</a:t>
+            </a:r>
+          </a:p>
+          <a:p>
+            <a:endParaRPr lang="en-CA" dirty="0"/>
+          </a:p>
+          <a:p>
+            <a:r>
+              <a:rPr lang="en-CA" dirty="0"/>
+              <a:t>Remember your labs! It’s still due every Sunday 11:59pm, one week after every posting!</a:t>
+            </a:r>
+          </a:p>
+          <a:p>
             <a:endParaRPr lang="en-CA" dirty="0"/>
           </a:p>
         </p:txBody>
@@ -6601,7 +4062,7 @@
     </p:spTree>
     <p:extLst>
       <p:ext uri="{BB962C8B-B14F-4D97-AF65-F5344CB8AC3E}">
-        <p14:creationId xmlns:p14="http://schemas.microsoft.com/office/powerpoint/2010/main" val="2451910484"/>
+        <p14:creationId xmlns:p14="http://schemas.microsoft.com/office/powerpoint/2010/main" val="3364035182"/>
       </p:ext>
     </p:extLst>
   </p:cSld>
@@ -6686,7 +4147,7 @@
             <a:pPr lvl="1"/>
             <a:r>
               <a:rPr lang="en-CA" dirty="0"/>
-              <a:t>The lesson (which is right now!)</a:t>
+              <a:t>The lesson (we’re learning a whole new language today!)</a:t>
             </a:r>
           </a:p>
           <a:p>
@@ -6700,14 +4161,7 @@
             <a:pPr lvl="2"/>
             <a:r>
               <a:rPr lang="en-CA" dirty="0"/>
-              <a:t>We will first code HTML pages using the &lt;style&gt; tags</a:t>
-            </a:r>
-          </a:p>
-          <a:p>
-            <a:pPr lvl="2"/>
-            <a:r>
-              <a:rPr lang="en-CA" dirty="0"/>
-              <a:t>Then, we will write CSS pages accompanying the HTML pages</a:t>
+              <a:t>It’s pretty much the whole lesson today. We’re going to cover the ppt first in just 15 minutes…</a:t>
             </a:r>
           </a:p>
         </p:txBody>
@@ -6765,7 +4219,7 @@
           <a:p>
             <a:r>
               <a:rPr lang="en-CA" dirty="0"/>
-              <a:t>Quick recap with HTML (1)</a:t>
+              <a:t>Introduction to JavaScript (1)</a:t>
             </a:r>
           </a:p>
         </p:txBody>
@@ -6789,67 +4243,30 @@
         <p:spPr/>
         <p:txBody>
           <a:bodyPr>
-            <a:normAutofit lnSpcReduction="10000"/>
+            <a:normAutofit/>
           </a:bodyPr>
           <a:lstStyle/>
           <a:p>
             <a:r>
               <a:rPr lang="en-CA" dirty="0"/>
-              <a:t>With the first lesson now over, what have you learned so far?</a:t>
+              <a:t>We will be focusing on a new language today</a:t>
             </a:r>
           </a:p>
           <a:p>
             <a:r>
               <a:rPr lang="en-CA" dirty="0"/>
-              <a:t>During the HTML lesson, you have seen how to:</a:t>
+              <a:t>Learn the essentials of JavaScript</a:t>
             </a:r>
           </a:p>
           <a:p>
             <a:pPr lvl="1"/>
             <a:r>
               <a:rPr lang="en-CA" dirty="0"/>
-              <a:t>Write HTML pages</a:t>
-            </a:r>
-          </a:p>
-          <a:p>
-            <a:pPr lvl="1"/>
-            <a:r>
-              <a:rPr lang="en-CA" dirty="0"/>
-              <a:t>What HTML tags are (and why they are useful!)</a:t>
-            </a:r>
-          </a:p>
-          <a:p>
-            <a:pPr lvl="1"/>
-            <a:r>
-              <a:rPr lang="en-CA" dirty="0"/>
-              <a:t>What elements and content within HTML tags are</a:t>
-            </a:r>
-          </a:p>
-          <a:p>
-            <a:r>
-              <a:rPr lang="en-CA" dirty="0"/>
-              <a:t>Of course, remember that the majority of these tags need the start and end tags (the beginning of the tag block and the ending of the tag block) in order for their functionality to work</a:t>
-            </a:r>
-          </a:p>
-          <a:p>
-            <a:r>
-              <a:rPr lang="en-CA" dirty="0"/>
-              <a:t>HTML pages always comes with a &lt;head&gt; tag and a &lt;body&gt; tag</a:t>
-            </a:r>
-          </a:p>
-          <a:p>
-            <a:pPr lvl="1"/>
-            <a:r>
-              <a:rPr lang="en-CA" dirty="0"/>
-              <a:t>&lt;head&gt; defines the webpage itself</a:t>
-            </a:r>
-          </a:p>
-          <a:p>
-            <a:pPr lvl="1"/>
-            <a:r>
-              <a:rPr lang="en-CA" dirty="0"/>
-              <a:t>&lt;body&gt; defines the contents that will be present (and shown) on the webpage</a:t>
-            </a:r>
+              <a:t>Why JavaScript?</a:t>
+            </a:r>
+          </a:p>
+          <a:p>
+            <a:endParaRPr lang="en-CA" dirty="0"/>
           </a:p>
           <a:p>
             <a:pPr lvl="1"/>
@@ -6859,10 +4276,10 @@
       </p:sp>
       <p:pic>
         <p:nvPicPr>
-          <p:cNvPr id="2050" name="Picture 2" descr="Image result for Coding in HTML memes">
+          <p:cNvPr id="4" name="Picture 2" descr="Image result for JavaScript memes">
             <a:extLst>
               <a:ext uri="{FF2B5EF4-FFF2-40B4-BE49-F238E27FC236}">
-                <a16:creationId xmlns:a16="http://schemas.microsoft.com/office/drawing/2014/main" id="{03254407-C556-4AE4-A790-CEA49640CF55}"/>
+                <a16:creationId xmlns:a16="http://schemas.microsoft.com/office/drawing/2014/main" id="{C7BC605F-0DB5-4875-9990-9C221C3F76FE}"/>
               </a:ext>
             </a:extLst>
           </p:cNvPr>
@@ -6886,8 +4303,8 @@
         </p:blipFill>
         <p:spPr bwMode="auto">
           <a:xfrm>
-            <a:off x="9309100" y="2194379"/>
-            <a:ext cx="1905000" cy="1714500"/>
+            <a:off x="7230156" y="1333047"/>
+            <a:ext cx="4524375" cy="5353050"/>
           </a:xfrm>
           <a:prstGeom prst="rect">
             <a:avLst/>
@@ -6957,7 +4374,15 @@
           <a:p>
             <a:r>
               <a:rPr lang="en-CA" dirty="0"/>
-              <a:t>Quick recap with HTML (2)</a:t>
+              <a:t>Introduction to </a:t>
+            </a:r>
+            <a:r>
+              <a:rPr lang="en-CA" dirty="0" err="1"/>
+              <a:t>Javascript</a:t>
+            </a:r>
+            <a:r>
+              <a:rPr lang="en-CA" dirty="0"/>
+              <a:t> (2) </a:t>
             </a:r>
           </a:p>
         </p:txBody>
@@ -6985,22 +4410,35 @@
           <a:p>
             <a:r>
               <a:rPr lang="en-CA" dirty="0"/>
-              <a:t>Any questions about HTML?</a:t>
-            </a:r>
-          </a:p>
-          <a:p>
+              <a:t>JavaScript is a scripting language that is now widely used and accepted by many</a:t>
+            </a:r>
+          </a:p>
+          <a:p>
+            <a:pPr lvl="1"/>
             <a:r>
               <a:rPr lang="en-CA" dirty="0"/>
-              <a:t>Did you learn something cool in the process?</a:t>
-            </a:r>
-          </a:p>
-          <a:p>
-            <a:pPr marL="0" indent="0" algn="ctr">
-              <a:buNone/>
-            </a:pPr>
+              <a:t>It has many fundamentals as a dynamic, but weak, scripting language</a:t>
+            </a:r>
+          </a:p>
+          <a:p>
+            <a:pPr lvl="1"/>
             <a:r>
               <a:rPr lang="en-CA" dirty="0"/>
-              <a:t>Now, onto the lesson…</a:t>
+              <a:t>It is functional (meaning that you can create first-class functions)</a:t>
+            </a:r>
+          </a:p>
+          <a:p>
+            <a:pPr lvl="1"/>
+            <a:r>
+              <a:rPr lang="en-CA" dirty="0"/>
+              <a:t>It is object oriented (have you used Python, Java, C++?)</a:t>
+            </a:r>
+          </a:p>
+          <a:p>
+            <a:pPr lvl="1"/>
+            <a:r>
+              <a:rPr lang="en-CA" dirty="0"/>
+              <a:t>It is now coming out of the box (you can develop programs outside of web development!)</a:t>
             </a:r>
           </a:p>
         </p:txBody>
@@ -7015,139 +4453,6 @@
   <p:clrMapOvr>
     <a:masterClrMapping/>
   </p:clrMapOvr>
-  <p:timing>
-    <p:tnLst>
-      <p:par>
-        <p:cTn id="1" dur="indefinite" restart="never" nodeType="tmRoot">
-          <p:childTnLst>
-            <p:seq concurrent="1" nextAc="seek">
-              <p:cTn id="2" dur="indefinite" nodeType="mainSeq">
-                <p:childTnLst>
-                  <p:par>
-                    <p:cTn id="3" fill="hold">
-                      <p:stCondLst>
-                        <p:cond delay="indefinite"/>
-                      </p:stCondLst>
-                      <p:childTnLst>
-                        <p:par>
-                          <p:cTn id="4" fill="hold">
-                            <p:stCondLst>
-                              <p:cond delay="0"/>
-                            </p:stCondLst>
-                            <p:childTnLst>
-                              <p:par>
-                                <p:cTn id="5" presetID="2" presetClass="entr" presetSubtype="4" fill="hold" nodeType="clickEffect">
-                                  <p:stCondLst>
-                                    <p:cond delay="0"/>
-                                  </p:stCondLst>
-                                  <p:childTnLst>
-                                    <p:set>
-                                      <p:cBhvr>
-                                        <p:cTn id="6" dur="1" fill="hold">
-                                          <p:stCondLst>
-                                            <p:cond delay="0"/>
-                                          </p:stCondLst>
-                                        </p:cTn>
-                                        <p:tgtEl>
-                                          <p:spTgt spid="3">
-                                            <p:txEl>
-                                              <p:pRg st="2" end="2"/>
-                                            </p:txEl>
-                                          </p:spTgt>
-                                        </p:tgtEl>
-                                        <p:attrNameLst>
-                                          <p:attrName>style.visibility</p:attrName>
-                                        </p:attrNameLst>
-                                      </p:cBhvr>
-                                      <p:to>
-                                        <p:strVal val="visible"/>
-                                      </p:to>
-                                    </p:set>
-                                    <p:anim calcmode="lin" valueType="num">
-                                      <p:cBhvr additive="base">
-                                        <p:cTn id="7" dur="500" fill="hold"/>
-                                        <p:tgtEl>
-                                          <p:spTgt spid="3">
-                                            <p:txEl>
-                                              <p:pRg st="2" end="2"/>
-                                            </p:txEl>
-                                          </p:spTgt>
-                                        </p:tgtEl>
-                                        <p:attrNameLst>
-                                          <p:attrName>ppt_x</p:attrName>
-                                        </p:attrNameLst>
-                                      </p:cBhvr>
-                                      <p:tavLst>
-                                        <p:tav tm="0">
-                                          <p:val>
-                                            <p:strVal val="#ppt_x"/>
-                                          </p:val>
-                                        </p:tav>
-                                        <p:tav tm="100000">
-                                          <p:val>
-                                            <p:strVal val="#ppt_x"/>
-                                          </p:val>
-                                        </p:tav>
-                                      </p:tavLst>
-                                    </p:anim>
-                                    <p:anim calcmode="lin" valueType="num">
-                                      <p:cBhvr additive="base">
-                                        <p:cTn id="8" dur="500" fill="hold"/>
-                                        <p:tgtEl>
-                                          <p:spTgt spid="3">
-                                            <p:txEl>
-                                              <p:pRg st="2" end="2"/>
-                                            </p:txEl>
-                                          </p:spTgt>
-                                        </p:tgtEl>
-                                        <p:attrNameLst>
-                                          <p:attrName>ppt_y</p:attrName>
-                                        </p:attrNameLst>
-                                      </p:cBhvr>
-                                      <p:tavLst>
-                                        <p:tav tm="0">
-                                          <p:val>
-                                            <p:strVal val="1+#ppt_h/2"/>
-                                          </p:val>
-                                        </p:tav>
-                                        <p:tav tm="100000">
-                                          <p:val>
-                                            <p:strVal val="#ppt_y"/>
-                                          </p:val>
-                                        </p:tav>
-                                      </p:tavLst>
-                                    </p:anim>
-                                  </p:childTnLst>
-                                </p:cTn>
-                              </p:par>
-                            </p:childTnLst>
-                          </p:cTn>
-                        </p:par>
-                      </p:childTnLst>
-                    </p:cTn>
-                  </p:par>
-                </p:childTnLst>
-              </p:cTn>
-              <p:prevCondLst>
-                <p:cond evt="onPrev" delay="0">
-                  <p:tgtEl>
-                    <p:sldTgt/>
-                  </p:tgtEl>
-                </p:cond>
-              </p:prevCondLst>
-              <p:nextCondLst>
-                <p:cond evt="onNext" delay="0">
-                  <p:tgtEl>
-                    <p:sldTgt/>
-                  </p:tgtEl>
-                </p:cond>
-              </p:nextCondLst>
-            </p:seq>
-          </p:childTnLst>
-        </p:cTn>
-      </p:par>
-    </p:tnLst>
-  </p:timing>
 </p:sld>
 </file>
 
@@ -7191,7 +4496,15 @@
           <a:p>
             <a:r>
               <a:rPr lang="en-CA" dirty="0"/>
-              <a:t>Styling your HTML Page (1)</a:t>
+              <a:t>Introduction to </a:t>
+            </a:r>
+            <a:r>
+              <a:rPr lang="en-CA" dirty="0" err="1"/>
+              <a:t>Javascript</a:t>
+            </a:r>
+            <a:r>
+              <a:rPr lang="en-CA" dirty="0"/>
+              <a:t> (3) </a:t>
             </a:r>
           </a:p>
         </p:txBody>
@@ -7219,27 +4532,19 @@
           <a:p>
             <a:r>
               <a:rPr lang="en-CA" dirty="0"/>
-              <a:t>As you may have guessed, you can stylize your HTML page</a:t>
+              <a:t>It’s very neat, actually!</a:t>
             </a:r>
           </a:p>
           <a:p>
             <a:r>
               <a:rPr lang="en-CA" dirty="0"/>
-              <a:t>This can make your highlighted content stand out…</a:t>
-            </a:r>
-          </a:p>
-          <a:p>
-            <a:pPr lvl="1"/>
+              <a:t>JavaScript programs can run quite fast now after compilation/running the program</a:t>
+            </a:r>
+          </a:p>
+          <a:p>
             <a:r>
               <a:rPr lang="en-CA" dirty="0"/>
-              <a:t>Possibly in a good way (hopefully!)</a:t>
-            </a:r>
-          </a:p>
-          <a:p>
-            <a:pPr lvl="1"/>
-            <a:r>
-              <a:rPr lang="en-CA" dirty="0"/>
-              <a:t>But also possibly in a bad way</a:t>
+              <a:t>It’s usually utilized in web development!</a:t>
             </a:r>
           </a:p>
         </p:txBody>
@@ -7247,7 +4552,7 @@
     </p:spTree>
     <p:extLst>
       <p:ext uri="{BB962C8B-B14F-4D97-AF65-F5344CB8AC3E}">
-        <p14:creationId xmlns:p14="http://schemas.microsoft.com/office/powerpoint/2010/main" val="3749021995"/>
+        <p14:creationId xmlns:p14="http://schemas.microsoft.com/office/powerpoint/2010/main" val="3237139595"/>
       </p:ext>
     </p:extLst>
   </p:cSld>
@@ -7297,7 +4602,15 @@
           <a:p>
             <a:r>
               <a:rPr lang="en-CA" dirty="0"/>
-              <a:t>Styling your HTML Page (1)</a:t>
+              <a:t>Introduction to </a:t>
+            </a:r>
+            <a:r>
+              <a:rPr lang="en-CA" dirty="0" err="1"/>
+              <a:t>Javascript</a:t>
+            </a:r>
+            <a:r>
+              <a:rPr lang="en-CA" dirty="0"/>
+              <a:t> (4) </a:t>
             </a:r>
           </a:p>
         </p:txBody>
@@ -7325,52 +4638,24 @@
           <a:p>
             <a:r>
               <a:rPr lang="en-CA" dirty="0"/>
-              <a:t>To be able to style your HTML page, let’s take a look at &lt;style&gt; tags</a:t>
-            </a:r>
-          </a:p>
-          <a:p>
-            <a:r>
-              <a:rPr lang="en-CA" dirty="0"/>
-              <a:t>What are &lt;style&gt; tags and why are they useful?</a:t>
-            </a:r>
-          </a:p>
-          <a:p>
-            <a:pPr lvl="1"/>
-            <a:r>
-              <a:rPr lang="en-CA" dirty="0"/>
-              <a:t>These are tags that contain elements within its tag block</a:t>
-            </a:r>
-          </a:p>
-          <a:p>
-            <a:pPr lvl="1"/>
-            <a:r>
-              <a:rPr lang="en-CA" dirty="0"/>
-              <a:t>It’s just like any other HTML tag… only that the elements (contents) inside the tag are not physically displayed onscreen</a:t>
-            </a:r>
-          </a:p>
-          <a:p>
-            <a:pPr lvl="1"/>
-            <a:r>
-              <a:rPr lang="en-CA" dirty="0"/>
-              <a:t>These elements help define the aesthetics of particular content</a:t>
-            </a:r>
-          </a:p>
-          <a:p>
-            <a:pPr lvl="1"/>
-            <a:r>
-              <a:rPr lang="en-CA" dirty="0"/>
-              <a:t>This depends on what you want to define (not everything gets defined here…)</a:t>
-            </a:r>
-          </a:p>
-          <a:p>
-            <a:endParaRPr lang="en-CA" dirty="0"/>
+              <a:t>However, don’t think of JavaScript as Java…</a:t>
+            </a:r>
+          </a:p>
+          <a:p>
+            <a:pPr marL="0" indent="0" algn="ctr">
+              <a:buNone/>
+            </a:pPr>
+            <a:r>
+              <a:rPr lang="en-CA" b="1" i="1" dirty="0"/>
+              <a:t>JavaScript is to Java as a Carpet is to a Car.</a:t>
+            </a:r>
           </a:p>
         </p:txBody>
       </p:sp>
     </p:spTree>
     <p:extLst>
       <p:ext uri="{BB962C8B-B14F-4D97-AF65-F5344CB8AC3E}">
-        <p14:creationId xmlns:p14="http://schemas.microsoft.com/office/powerpoint/2010/main" val="1135677984"/>
+        <p14:creationId xmlns:p14="http://schemas.microsoft.com/office/powerpoint/2010/main" val="572985277"/>
       </p:ext>
     </p:extLst>
   </p:cSld>
@@ -7420,7 +4705,15 @@
           <a:p>
             <a:r>
               <a:rPr lang="en-CA" dirty="0"/>
-              <a:t>Styling your HTML Page (2)</a:t>
+              <a:t>Introduction to </a:t>
+            </a:r>
+            <a:r>
+              <a:rPr lang="en-CA" dirty="0" err="1"/>
+              <a:t>Javascript</a:t>
+            </a:r>
+            <a:r>
+              <a:rPr lang="en-CA" dirty="0"/>
+              <a:t> (5) </a:t>
             </a:r>
           </a:p>
         </p:txBody>
@@ -7448,21 +4741,30 @@
           <a:p>
             <a:r>
               <a:rPr lang="en-CA" dirty="0"/>
-              <a:t>When using &lt;style&gt; tags, what does your typical element look like?</a:t>
+              <a:t>In other words, JavaScript does not contain the Java language in any way possible…</a:t>
             </a:r>
           </a:p>
           <a:p>
             <a:r>
               <a:rPr lang="en-CA" dirty="0"/>
-              <a:t>&lt;style&gt; tags usually contain what you want to stylize and the rules that accompany that</a:t>
-            </a:r>
+              <a:t>Your variables are not quite typed</a:t>
+            </a:r>
+          </a:p>
+          <a:p>
+            <a:r>
+              <a:rPr lang="en-CA" dirty="0"/>
+              <a:t>You can write functions in two different ways that is not like in Java</a:t>
+            </a:r>
+          </a:p>
+          <a:p>
+            <a:endParaRPr lang="en-CA" dirty="0"/>
           </a:p>
         </p:txBody>
       </p:sp>
     </p:spTree>
     <p:extLst>
       <p:ext uri="{BB962C8B-B14F-4D97-AF65-F5344CB8AC3E}">
-        <p14:creationId xmlns:p14="http://schemas.microsoft.com/office/powerpoint/2010/main" val="2504863890"/>
+        <p14:creationId xmlns:p14="http://schemas.microsoft.com/office/powerpoint/2010/main" val="2400742032"/>
       </p:ext>
     </p:extLst>
   </p:cSld>

</xml_diff>

<commit_message>
Fixing up scheduling for everything
</commit_message>
<xml_diff>
--- a/lessons/lesson_note3.pptx
+++ b/lessons/lesson_note3.pptx
@@ -15,8 +15,6 @@
     <p:sldId id="322" r:id="rId9"/>
     <p:sldId id="323" r:id="rId10"/>
     <p:sldId id="324" r:id="rId11"/>
-    <p:sldId id="313" r:id="rId12"/>
-    <p:sldId id="325" r:id="rId13"/>
   </p:sldIdLst>
   <p:sldSz cx="12192000" cy="6858000"/>
   <p:notesSz cx="6858000" cy="9144000"/>
@@ -123,10 +121,6 @@
 </p:presentation>
 </file>
 
-<file path=ppt/revisionInfo.xml><?xml version="1.0" encoding="utf-8"?>
-<p1510:revInfo xmlns:a="http://schemas.openxmlformats.org/drawingml/2006/main" xmlns:r="http://schemas.openxmlformats.org/officeDocument/2006/relationships" xmlns:p1510="http://schemas.microsoft.com/office/powerpoint/2015/10/main"/>
-</file>
-
 <file path=ppt/slideLayouts/slideLayout1.xml><?xml version="1.0" encoding="utf-8"?>
 <p:sldLayout xmlns:a="http://schemas.openxmlformats.org/drawingml/2006/main" xmlns:r="http://schemas.openxmlformats.org/officeDocument/2006/relationships" xmlns:p="http://schemas.openxmlformats.org/presentationml/2006/main" showMasterSp="0" type="title" preserve="1">
   <p:cSld name="Title Slide">
@@ -303,7 +297,7 @@
           <a:p>
             <a:fld id="{96DFF08F-DC6B-4601-B491-B0F83F6DD2DA}" type="datetimeFigureOut">
               <a:rPr lang="en-US" dirty="0"/>
-              <a:t>2/3/2018</a:t>
+              <a:t>2/11/2018</a:t>
             </a:fld>
             <a:endParaRPr lang="en-US" dirty="0"/>
           </a:p>
@@ -468,7 +462,7 @@
           <a:p>
             <a:fld id="{96DFF08F-DC6B-4601-B491-B0F83F6DD2DA}" type="datetimeFigureOut">
               <a:rPr lang="en-US" dirty="0"/>
-              <a:t>2/3/2018</a:t>
+              <a:t>2/11/2018</a:t>
             </a:fld>
             <a:endParaRPr lang="en-US" dirty="0"/>
           </a:p>
@@ -686,7 +680,7 @@
           <a:p>
             <a:fld id="{96DFF08F-DC6B-4601-B491-B0F83F6DD2DA}" type="datetimeFigureOut">
               <a:rPr lang="en-US" dirty="0"/>
-              <a:t>2/3/2018</a:t>
+              <a:t>2/11/2018</a:t>
             </a:fld>
             <a:endParaRPr lang="en-US" dirty="0"/>
           </a:p>
@@ -861,7 +855,7 @@
           <a:p>
             <a:fld id="{96DFF08F-DC6B-4601-B491-B0F83F6DD2DA}" type="datetimeFigureOut">
               <a:rPr lang="en-US" dirty="0"/>
-              <a:t>2/3/2018</a:t>
+              <a:t>2/11/2018</a:t>
             </a:fld>
             <a:endParaRPr lang="en-US" dirty="0"/>
           </a:p>
@@ -1163,7 +1157,7 @@
             <a:fld id="{96DFF08F-DC6B-4601-B491-B0F83F6DD2DA}" type="datetimeFigureOut">
               <a:rPr lang="en-US" dirty="0"/>
               <a:pPr/>
-              <a:t>2/3/2018</a:t>
+              <a:t>2/11/2018</a:t>
             </a:fld>
             <a:endParaRPr lang="en-US" dirty="0"/>
           </a:p>
@@ -1463,7 +1457,7 @@
           <a:p>
             <a:fld id="{96DFF08F-DC6B-4601-B491-B0F83F6DD2DA}" type="datetimeFigureOut">
               <a:rPr lang="en-US" dirty="0"/>
-              <a:t>2/3/2018</a:t>
+              <a:t>2/11/2018</a:t>
             </a:fld>
             <a:endParaRPr lang="en-US" dirty="0"/>
           </a:p>
@@ -1880,7 +1874,7 @@
           <a:p>
             <a:fld id="{96DFF08F-DC6B-4601-B491-B0F83F6DD2DA}" type="datetimeFigureOut">
               <a:rPr lang="en-US" dirty="0"/>
-              <a:t>2/3/2018</a:t>
+              <a:t>2/11/2018</a:t>
             </a:fld>
             <a:endParaRPr lang="en-US" dirty="0"/>
           </a:p>
@@ -1993,7 +1987,7 @@
           <a:p>
             <a:fld id="{96DFF08F-DC6B-4601-B491-B0F83F6DD2DA}" type="datetimeFigureOut">
               <a:rPr lang="en-US" dirty="0"/>
-              <a:t>2/3/2018</a:t>
+              <a:t>2/11/2018</a:t>
             </a:fld>
             <a:endParaRPr lang="en-US" dirty="0"/>
           </a:p>
@@ -2083,7 +2077,7 @@
           <a:p>
             <a:fld id="{96DFF08F-DC6B-4601-B491-B0F83F6DD2DA}" type="datetimeFigureOut">
               <a:rPr lang="en-US" dirty="0"/>
-              <a:t>2/3/2018</a:t>
+              <a:t>2/11/2018</a:t>
             </a:fld>
             <a:endParaRPr lang="en-US" dirty="0"/>
           </a:p>
@@ -2351,7 +2345,7 @@
           <a:p>
             <a:fld id="{96DFF08F-DC6B-4601-B491-B0F83F6DD2DA}" type="datetimeFigureOut">
               <a:rPr lang="en-US" dirty="0"/>
-              <a:t>2/3/2018</a:t>
+              <a:t>2/11/2018</a:t>
             </a:fld>
             <a:endParaRPr lang="en-US" dirty="0"/>
           </a:p>
@@ -2611,7 +2605,7 @@
           <a:p>
             <a:fld id="{96DFF08F-DC6B-4601-B491-B0F83F6DD2DA}" type="datetimeFigureOut">
               <a:rPr lang="en-US" dirty="0"/>
-              <a:t>2/3/2018</a:t>
+              <a:t>2/11/2018</a:t>
             </a:fld>
             <a:endParaRPr lang="en-US" dirty="0"/>
           </a:p>
@@ -2856,7 +2850,7 @@
             <a:fld id="{96DFF08F-DC6B-4601-B491-B0F83F6DD2DA}" type="datetimeFigureOut">
               <a:rPr lang="en-US" dirty="0"/>
               <a:pPr/>
-              <a:t>2/3/2018</a:t>
+              <a:t>2/11/2018</a:t>
             </a:fld>
             <a:endParaRPr lang="en-US" dirty="0"/>
           </a:p>
@@ -3372,7 +3366,7 @@
           <a:p>
             <a:r>
               <a:rPr lang="en-CA" dirty="0"/>
-              <a:t>February 3, 2018</a:t>
+              <a:t>February 3 and 17, 2018</a:t>
             </a:r>
           </a:p>
         </p:txBody>
@@ -3429,12 +3423,8 @@
           <a:lstStyle/>
           <a:p>
             <a:r>
-              <a:rPr lang="en-CA" dirty="0" err="1"/>
-              <a:t>Javascript</a:t>
-            </a:r>
-            <a:r>
               <a:rPr lang="en-CA" dirty="0"/>
-              <a:t> Essentials (1)</a:t>
+              <a:t>JavaScript Essentials (1)</a:t>
             </a:r>
           </a:p>
         </p:txBody>
@@ -3486,266 +3476,6 @@
     <p:extLst>
       <p:ext uri="{BB962C8B-B14F-4D97-AF65-F5344CB8AC3E}">
         <p14:creationId xmlns:p14="http://schemas.microsoft.com/office/powerpoint/2010/main" val="4291014310"/>
-      </p:ext>
-    </p:extLst>
-  </p:cSld>
-  <p:clrMapOvr>
-    <a:masterClrMapping/>
-  </p:clrMapOvr>
-</p:sld>
-</file>
-
-<file path=ppt/slides/slide11.xml><?xml version="1.0" encoding="utf-8"?>
-<p:sld xmlns:a="http://schemas.openxmlformats.org/drawingml/2006/main" xmlns:r="http://schemas.openxmlformats.org/officeDocument/2006/relationships" xmlns:p="http://schemas.openxmlformats.org/presentationml/2006/main">
-  <p:cSld>
-    <p:spTree>
-      <p:nvGrpSpPr>
-        <p:cNvPr id="1" name=""/>
-        <p:cNvGrpSpPr/>
-        <p:nvPr/>
-      </p:nvGrpSpPr>
-      <p:grpSpPr>
-        <a:xfrm>
-          <a:off x="0" y="0"/>
-          <a:ext cx="0" cy="0"/>
-          <a:chOff x="0" y="0"/>
-          <a:chExt cx="0" cy="0"/>
-        </a:xfrm>
-      </p:grpSpPr>
-      <p:sp>
-        <p:nvSpPr>
-          <p:cNvPr id="2" name="Title 1">
-            <a:extLst>
-              <a:ext uri="{FF2B5EF4-FFF2-40B4-BE49-F238E27FC236}">
-                <a16:creationId xmlns:a16="http://schemas.microsoft.com/office/drawing/2014/main" id="{FD4CC6C4-B889-42E4-BA31-28441A814021}"/>
-              </a:ext>
-            </a:extLst>
-          </p:cNvPr>
-          <p:cNvSpPr>
-            <a:spLocks noGrp="1"/>
-          </p:cNvSpPr>
-          <p:nvPr>
-            <p:ph type="title"/>
-          </p:nvPr>
-        </p:nvSpPr>
-        <p:spPr/>
-        <p:txBody>
-          <a:bodyPr/>
-          <a:lstStyle/>
-          <a:p>
-            <a:r>
-              <a:rPr lang="en-CA" dirty="0"/>
-              <a:t>Break #1</a:t>
-            </a:r>
-          </a:p>
-        </p:txBody>
-      </p:sp>
-      <p:sp>
-        <p:nvSpPr>
-          <p:cNvPr id="4" name="Content Placeholder 3">
-            <a:extLst>
-              <a:ext uri="{FF2B5EF4-FFF2-40B4-BE49-F238E27FC236}">
-                <a16:creationId xmlns:a16="http://schemas.microsoft.com/office/drawing/2014/main" id="{A14C1509-144C-4E9E-BC44-38AABB128F97}"/>
-              </a:ext>
-            </a:extLst>
-          </p:cNvPr>
-          <p:cNvSpPr>
-            <a:spLocks noGrp="1"/>
-          </p:cNvSpPr>
-          <p:nvPr>
-            <p:ph idx="1"/>
-          </p:nvPr>
-        </p:nvSpPr>
-        <p:spPr/>
-        <p:txBody>
-          <a:bodyPr/>
-          <a:lstStyle/>
-          <a:p>
-            <a:endParaRPr lang="en-CA" dirty="0"/>
-          </a:p>
-        </p:txBody>
-      </p:sp>
-      <p:pic>
-        <p:nvPicPr>
-          <p:cNvPr id="3074" name="Picture 2" descr="Image result for Take a break memes">
-            <a:extLst>
-              <a:ext uri="{FF2B5EF4-FFF2-40B4-BE49-F238E27FC236}">
-                <a16:creationId xmlns:a16="http://schemas.microsoft.com/office/drawing/2014/main" id="{4EC9280F-2B30-4025-9884-9770FB88BBD8}"/>
-              </a:ext>
-            </a:extLst>
-          </p:cNvPr>
-          <p:cNvPicPr>
-            <a:picLocks noChangeAspect="1" noChangeArrowheads="1"/>
-          </p:cNvPicPr>
-          <p:nvPr/>
-        </p:nvPicPr>
-        <p:blipFill>
-          <a:blip r:embed="rId2">
-            <a:extLst>
-              <a:ext uri="{28A0092B-C50C-407E-A947-70E740481C1C}">
-                <a14:useLocalDpi xmlns:a14="http://schemas.microsoft.com/office/drawing/2010/main" val="0"/>
-              </a:ext>
-            </a:extLst>
-          </a:blip>
-          <a:srcRect/>
-          <a:stretch>
-            <a:fillRect/>
-          </a:stretch>
-        </p:blipFill>
-        <p:spPr bwMode="auto">
-          <a:xfrm>
-            <a:off x="3656559" y="1905227"/>
-            <a:ext cx="4876800" cy="3686175"/>
-          </a:xfrm>
-          <a:prstGeom prst="rect">
-            <a:avLst/>
-          </a:prstGeom>
-          <a:noFill/>
-          <a:extLst>
-            <a:ext uri="{909E8E84-426E-40DD-AFC4-6F175D3DCCD1}">
-              <a14:hiddenFill xmlns:a14="http://schemas.microsoft.com/office/drawing/2010/main">
-                <a:solidFill>
-                  <a:srgbClr val="FFFFFF"/>
-                </a:solidFill>
-              </a14:hiddenFill>
-            </a:ext>
-          </a:extLst>
-        </p:spPr>
-      </p:pic>
-    </p:spTree>
-    <p:extLst>
-      <p:ext uri="{BB962C8B-B14F-4D97-AF65-F5344CB8AC3E}">
-        <p14:creationId xmlns:p14="http://schemas.microsoft.com/office/powerpoint/2010/main" val="1735443227"/>
-      </p:ext>
-    </p:extLst>
-  </p:cSld>
-  <p:clrMapOvr>
-    <a:masterClrMapping/>
-  </p:clrMapOvr>
-</p:sld>
-</file>
-
-<file path=ppt/slides/slide12.xml><?xml version="1.0" encoding="utf-8"?>
-<p:sld xmlns:a="http://schemas.openxmlformats.org/drawingml/2006/main" xmlns:r="http://schemas.openxmlformats.org/officeDocument/2006/relationships" xmlns:p="http://schemas.openxmlformats.org/presentationml/2006/main">
-  <p:cSld>
-    <p:spTree>
-      <p:nvGrpSpPr>
-        <p:cNvPr id="1" name=""/>
-        <p:cNvGrpSpPr/>
-        <p:nvPr/>
-      </p:nvGrpSpPr>
-      <p:grpSpPr>
-        <a:xfrm>
-          <a:off x="0" y="0"/>
-          <a:ext cx="0" cy="0"/>
-          <a:chOff x="0" y="0"/>
-          <a:chExt cx="0" cy="0"/>
-        </a:xfrm>
-      </p:grpSpPr>
-      <p:sp>
-        <p:nvSpPr>
-          <p:cNvPr id="2" name="Title 1">
-            <a:extLst>
-              <a:ext uri="{FF2B5EF4-FFF2-40B4-BE49-F238E27FC236}">
-                <a16:creationId xmlns:a16="http://schemas.microsoft.com/office/drawing/2014/main" id="{FD4CC6C4-B889-42E4-BA31-28441A814021}"/>
-              </a:ext>
-            </a:extLst>
-          </p:cNvPr>
-          <p:cNvSpPr>
-            <a:spLocks noGrp="1"/>
-          </p:cNvSpPr>
-          <p:nvPr>
-            <p:ph type="title"/>
-          </p:nvPr>
-        </p:nvSpPr>
-        <p:spPr/>
-        <p:txBody>
-          <a:bodyPr/>
-          <a:lstStyle/>
-          <a:p>
-            <a:r>
-              <a:rPr lang="en-CA" dirty="0"/>
-              <a:t>Break #2</a:t>
-            </a:r>
-          </a:p>
-        </p:txBody>
-      </p:sp>
-      <p:sp>
-        <p:nvSpPr>
-          <p:cNvPr id="4" name="Content Placeholder 3">
-            <a:extLst>
-              <a:ext uri="{FF2B5EF4-FFF2-40B4-BE49-F238E27FC236}">
-                <a16:creationId xmlns:a16="http://schemas.microsoft.com/office/drawing/2014/main" id="{A14C1509-144C-4E9E-BC44-38AABB128F97}"/>
-              </a:ext>
-            </a:extLst>
-          </p:cNvPr>
-          <p:cNvSpPr>
-            <a:spLocks noGrp="1"/>
-          </p:cNvSpPr>
-          <p:nvPr>
-            <p:ph idx="1"/>
-          </p:nvPr>
-        </p:nvSpPr>
-        <p:spPr/>
-        <p:txBody>
-          <a:bodyPr/>
-          <a:lstStyle/>
-          <a:p>
-            <a:endParaRPr lang="en-CA" dirty="0"/>
-          </a:p>
-        </p:txBody>
-      </p:sp>
-      <p:pic>
-        <p:nvPicPr>
-          <p:cNvPr id="4098" name="Picture 2" descr="Image result for Take a break memes">
-            <a:extLst>
-              <a:ext uri="{FF2B5EF4-FFF2-40B4-BE49-F238E27FC236}">
-                <a16:creationId xmlns:a16="http://schemas.microsoft.com/office/drawing/2014/main" id="{81AFB48A-B2F7-43F9-865D-4A2540FFF7EA}"/>
-              </a:ext>
-            </a:extLst>
-          </p:cNvPr>
-          <p:cNvPicPr>
-            <a:picLocks noChangeAspect="1" noChangeArrowheads="1"/>
-          </p:cNvPicPr>
-          <p:nvPr/>
-        </p:nvPicPr>
-        <p:blipFill>
-          <a:blip r:embed="rId2">
-            <a:extLst>
-              <a:ext uri="{28A0092B-C50C-407E-A947-70E740481C1C}">
-                <a14:useLocalDpi xmlns:a14="http://schemas.microsoft.com/office/drawing/2010/main" val="0"/>
-              </a:ext>
-            </a:extLst>
-          </a:blip>
-          <a:srcRect/>
-          <a:stretch>
-            <a:fillRect/>
-          </a:stretch>
-        </p:blipFill>
-        <p:spPr bwMode="auto">
-          <a:xfrm>
-            <a:off x="4189959" y="1792936"/>
-            <a:ext cx="3810000" cy="3810000"/>
-          </a:xfrm>
-          <a:prstGeom prst="rect">
-            <a:avLst/>
-          </a:prstGeom>
-          <a:noFill/>
-          <a:extLst>
-            <a:ext uri="{909E8E84-426E-40DD-AFC4-6F175D3DCCD1}">
-              <a14:hiddenFill xmlns:a14="http://schemas.microsoft.com/office/drawing/2010/main">
-                <a:solidFill>
-                  <a:srgbClr val="FFFFFF"/>
-                </a:solidFill>
-              </a14:hiddenFill>
-            </a:ext>
-          </a:extLst>
-        </p:spPr>
-      </p:pic>
-    </p:spTree>
-    <p:extLst>
-      <p:ext uri="{BB962C8B-B14F-4D97-AF65-F5344CB8AC3E}">
-        <p14:creationId xmlns:p14="http://schemas.microsoft.com/office/powerpoint/2010/main" val="3258687731"/>
       </p:ext>
     </p:extLst>
   </p:cSld>

</xml_diff>